<commit_message>
Commented out quotes without sound bytes for demo
</commit_message>
<xml_diff>
--- a/ppt/Terminal App Presentation.pptx
+++ b/ppt/Terminal App Presentation.pptx
@@ -5,7 +5,7 @@
     <p:sldMasterId id="2147483687" r:id="rId1"/>
   </p:sldMasterIdLst>
   <p:notesMasterIdLst>
-    <p:notesMasterId r:id="rId7"/>
+    <p:notesMasterId r:id="rId9"/>
   </p:notesMasterIdLst>
   <p:sldIdLst>
     <p:sldId id="256" r:id="rId2"/>
@@ -13,6 +13,8 @@
     <p:sldId id="258" r:id="rId4"/>
     <p:sldId id="260" r:id="rId5"/>
     <p:sldId id="259" r:id="rId6"/>
+    <p:sldId id="262" r:id="rId7"/>
+    <p:sldId id="261" r:id="rId8"/>
   </p:sldIdLst>
   <p:sldSz cx="12192000" cy="6858000"/>
   <p:notesSz cx="6858000" cy="9144000"/>
@@ -111,6 +113,11 @@
       </a:defRPr>
     </a:lvl9pPr>
   </p:defaultTextStyle>
+  <p:extLst>
+    <p:ext uri="{EFAFB233-063F-42B5-8137-9DF3F51BA10A}">
+      <p15:sldGuideLst xmlns:p15="http://schemas.microsoft.com/office/powerpoint/2012/main"/>
+    </p:ext>
+  </p:extLst>
 </p:presentation>
 </file>
 
@@ -509,7 +516,13 @@
           <a:p>
             <a:r>
               <a:rPr lang="en-US" dirty="0"/>
-              <a:t>Leaderboard: Talk about game save for data persistence</a:t>
+              <a:t>Hi gang, </a:t>
+            </a:r>
+          </a:p>
+          <a:p>
+            <a:r>
+              <a:rPr lang="en-US" dirty="0"/>
+              <a:t>I’m a Waldow, this is a presentation, and I built an app.</a:t>
             </a:r>
           </a:p>
         </p:txBody>
@@ -531,6 +544,362 @@
           <a:p>
             <a:fld id="{5FA8FB01-9704-264C-B39D-9A85F9662E5A}" type="slidenum">
               <a:rPr lang="en-US" smtClean="0"/>
+              <a:t>1</a:t>
+            </a:fld>
+            <a:endParaRPr lang="en-US"/>
+          </a:p>
+        </p:txBody>
+      </p:sp>
+    </p:spTree>
+    <p:extLst>
+      <p:ext uri="{BB962C8B-B14F-4D97-AF65-F5344CB8AC3E}">
+        <p14:creationId xmlns:p14="http://schemas.microsoft.com/office/powerpoint/2010/main" val="3561549595"/>
+      </p:ext>
+    </p:extLst>
+  </p:cSld>
+  <p:clrMapOvr>
+    <a:masterClrMapping/>
+  </p:clrMapOvr>
+</p:notes>
+</file>
+
+<file path=ppt/notesSlides/notesSlide2.xml><?xml version="1.0" encoding="utf-8"?>
+<p:notes xmlns:a="http://schemas.openxmlformats.org/drawingml/2006/main" xmlns:r="http://schemas.openxmlformats.org/officeDocument/2006/relationships" xmlns:p="http://schemas.openxmlformats.org/presentationml/2006/main">
+  <p:cSld>
+    <p:spTree>
+      <p:nvGrpSpPr>
+        <p:cNvPr id="1" name=""/>
+        <p:cNvGrpSpPr/>
+        <p:nvPr/>
+      </p:nvGrpSpPr>
+      <p:grpSpPr>
+        <a:xfrm>
+          <a:off x="0" y="0"/>
+          <a:ext cx="0" cy="0"/>
+          <a:chOff x="0" y="0"/>
+          <a:chExt cx="0" cy="0"/>
+        </a:xfrm>
+      </p:grpSpPr>
+      <p:sp>
+        <p:nvSpPr>
+          <p:cNvPr id="2" name="Slide Image Placeholder 1"/>
+          <p:cNvSpPr>
+            <a:spLocks noGrp="1" noRot="1" noChangeAspect="1"/>
+          </p:cNvSpPr>
+          <p:nvPr>
+            <p:ph type="sldImg"/>
+          </p:nvPr>
+        </p:nvSpPr>
+        <p:spPr/>
+      </p:sp>
+      <p:sp>
+        <p:nvSpPr>
+          <p:cNvPr id="3" name="Notes Placeholder 2"/>
+          <p:cNvSpPr>
+            <a:spLocks noGrp="1"/>
+          </p:cNvSpPr>
+          <p:nvPr>
+            <p:ph type="body" idx="1"/>
+          </p:nvPr>
+        </p:nvSpPr>
+        <p:spPr/>
+        <p:txBody>
+          <a:bodyPr/>
+          <a:lstStyle/>
+          <a:p>
+            <a:r>
+              <a:rPr lang="en-US" dirty="0"/>
+              <a:t>I’m going to cover these three topics today, so strap in.</a:t>
+            </a:r>
+          </a:p>
+        </p:txBody>
+      </p:sp>
+      <p:sp>
+        <p:nvSpPr>
+          <p:cNvPr id="4" name="Slide Number Placeholder 3"/>
+          <p:cNvSpPr>
+            <a:spLocks noGrp="1"/>
+          </p:cNvSpPr>
+          <p:nvPr>
+            <p:ph type="sldNum" sz="quarter" idx="10"/>
+          </p:nvPr>
+        </p:nvSpPr>
+        <p:spPr/>
+        <p:txBody>
+          <a:bodyPr/>
+          <a:lstStyle/>
+          <a:p>
+            <a:fld id="{5FA8FB01-9704-264C-B39D-9A85F9662E5A}" type="slidenum">
+              <a:rPr lang="en-US" smtClean="0"/>
+              <a:t>2</a:t>
+            </a:fld>
+            <a:endParaRPr lang="en-US"/>
+          </a:p>
+        </p:txBody>
+      </p:sp>
+    </p:spTree>
+    <p:extLst>
+      <p:ext uri="{BB962C8B-B14F-4D97-AF65-F5344CB8AC3E}">
+        <p14:creationId xmlns:p14="http://schemas.microsoft.com/office/powerpoint/2010/main" val="2388141654"/>
+      </p:ext>
+    </p:extLst>
+  </p:cSld>
+  <p:clrMapOvr>
+    <a:masterClrMapping/>
+  </p:clrMapOvr>
+</p:notes>
+</file>
+
+<file path=ppt/notesSlides/notesSlide3.xml><?xml version="1.0" encoding="utf-8"?>
+<p:notes xmlns:a="http://schemas.openxmlformats.org/drawingml/2006/main" xmlns:r="http://schemas.openxmlformats.org/officeDocument/2006/relationships" xmlns:p="http://schemas.openxmlformats.org/presentationml/2006/main">
+  <p:cSld>
+    <p:spTree>
+      <p:nvGrpSpPr>
+        <p:cNvPr id="1" name=""/>
+        <p:cNvGrpSpPr/>
+        <p:nvPr/>
+      </p:nvGrpSpPr>
+      <p:grpSpPr>
+        <a:xfrm>
+          <a:off x="0" y="0"/>
+          <a:ext cx="0" cy="0"/>
+          <a:chOff x="0" y="0"/>
+          <a:chExt cx="0" cy="0"/>
+        </a:xfrm>
+      </p:grpSpPr>
+      <p:sp>
+        <p:nvSpPr>
+          <p:cNvPr id="2" name="Slide Image Placeholder 1"/>
+          <p:cNvSpPr>
+            <a:spLocks noGrp="1" noRot="1" noChangeAspect="1"/>
+          </p:cNvSpPr>
+          <p:nvPr>
+            <p:ph type="sldImg"/>
+          </p:nvPr>
+        </p:nvSpPr>
+        <p:spPr/>
+      </p:sp>
+      <p:sp>
+        <p:nvSpPr>
+          <p:cNvPr id="3" name="Notes Placeholder 2"/>
+          <p:cNvSpPr>
+            <a:spLocks noGrp="1"/>
+          </p:cNvSpPr>
+          <p:nvPr>
+            <p:ph type="body" idx="1"/>
+          </p:nvPr>
+        </p:nvSpPr>
+        <p:spPr/>
+        <p:txBody>
+          <a:bodyPr/>
+          <a:lstStyle/>
+          <a:p>
+            <a:r>
+              <a:rPr lang="en-US" dirty="0"/>
+              <a:t>So what did I build?</a:t>
+            </a:r>
+          </a:p>
+          <a:p>
+            <a:endParaRPr lang="en-US" dirty="0"/>
+          </a:p>
+          <a:p>
+            <a:r>
+              <a:rPr lang="en-US" dirty="0"/>
+              <a:t>Due to the fact I am a huge Star Wars nerd, I built a Star Wars themed ‘Scissors, Paper, Rock’ simulator, called: </a:t>
+            </a:r>
+          </a:p>
+          <a:p>
+            <a:endParaRPr lang="en-US" dirty="0"/>
+          </a:p>
+          <a:p>
+            <a:r>
+              <a:rPr lang="en-US" dirty="0"/>
+              <a:t>‘</a:t>
+            </a:r>
+            <a:r>
+              <a:rPr lang="en-US" dirty="0" err="1"/>
+              <a:t>Sith</a:t>
+            </a:r>
+            <a:r>
+              <a:rPr lang="en-US" dirty="0"/>
+              <a:t>-Lord, Jedi, Ewok’</a:t>
+            </a:r>
+          </a:p>
+          <a:p>
+            <a:endParaRPr lang="en-US" dirty="0"/>
+          </a:p>
+          <a:p>
+            <a:r>
+              <a:rPr lang="en-US" dirty="0"/>
+              <a:t>Which works as a single play game, with the player competing against the computer</a:t>
+            </a:r>
+          </a:p>
+        </p:txBody>
+      </p:sp>
+      <p:sp>
+        <p:nvSpPr>
+          <p:cNvPr id="4" name="Slide Number Placeholder 3"/>
+          <p:cNvSpPr>
+            <a:spLocks noGrp="1"/>
+          </p:cNvSpPr>
+          <p:nvPr>
+            <p:ph type="sldNum" sz="quarter" idx="10"/>
+          </p:nvPr>
+        </p:nvSpPr>
+        <p:spPr/>
+        <p:txBody>
+          <a:bodyPr/>
+          <a:lstStyle/>
+          <a:p>
+            <a:fld id="{5FA8FB01-9704-264C-B39D-9A85F9662E5A}" type="slidenum">
+              <a:rPr lang="en-US" smtClean="0"/>
+              <a:t>3</a:t>
+            </a:fld>
+            <a:endParaRPr lang="en-US"/>
+          </a:p>
+        </p:txBody>
+      </p:sp>
+    </p:spTree>
+    <p:extLst>
+      <p:ext uri="{BB962C8B-B14F-4D97-AF65-F5344CB8AC3E}">
+        <p14:creationId xmlns:p14="http://schemas.microsoft.com/office/powerpoint/2010/main" val="2703486088"/>
+      </p:ext>
+    </p:extLst>
+  </p:cSld>
+  <p:clrMapOvr>
+    <a:masterClrMapping/>
+  </p:clrMapOvr>
+</p:notes>
+</file>
+
+<file path=ppt/notesSlides/notesSlide4.xml><?xml version="1.0" encoding="utf-8"?>
+<p:notes xmlns:a="http://schemas.openxmlformats.org/drawingml/2006/main" xmlns:r="http://schemas.openxmlformats.org/officeDocument/2006/relationships" xmlns:p="http://schemas.openxmlformats.org/presentationml/2006/main">
+  <p:cSld>
+    <p:spTree>
+      <p:nvGrpSpPr>
+        <p:cNvPr id="1" name=""/>
+        <p:cNvGrpSpPr/>
+        <p:nvPr/>
+      </p:nvGrpSpPr>
+      <p:grpSpPr>
+        <a:xfrm>
+          <a:off x="0" y="0"/>
+          <a:ext cx="0" cy="0"/>
+          <a:chOff x="0" y="0"/>
+          <a:chExt cx="0" cy="0"/>
+        </a:xfrm>
+      </p:grpSpPr>
+      <p:sp>
+        <p:nvSpPr>
+          <p:cNvPr id="2" name="Slide Image Placeholder 1"/>
+          <p:cNvSpPr>
+            <a:spLocks noGrp="1" noRot="1" noChangeAspect="1"/>
+          </p:cNvSpPr>
+          <p:nvPr>
+            <p:ph type="sldImg"/>
+          </p:nvPr>
+        </p:nvSpPr>
+        <p:spPr/>
+      </p:sp>
+      <p:sp>
+        <p:nvSpPr>
+          <p:cNvPr id="3" name="Notes Placeholder 2"/>
+          <p:cNvSpPr>
+            <a:spLocks noGrp="1"/>
+          </p:cNvSpPr>
+          <p:nvPr>
+            <p:ph type="body" idx="1"/>
+          </p:nvPr>
+        </p:nvSpPr>
+        <p:spPr/>
+        <p:txBody>
+          <a:bodyPr/>
+          <a:lstStyle/>
+          <a:p>
+            <a:r>
+              <a:rPr lang="en-US" dirty="0"/>
+              <a:t>Features:</a:t>
+            </a:r>
+          </a:p>
+          <a:p>
+            <a:endParaRPr lang="en-US" dirty="0"/>
+          </a:p>
+          <a:p>
+            <a:r>
+              <a:rPr lang="en-US" dirty="0"/>
+              <a:t>From the Main Menu of the game, players can select one of 4 options:</a:t>
+            </a:r>
+          </a:p>
+          <a:p>
+            <a:pPr marL="171450" indent="-171450">
+              <a:buFontTx/>
+              <a:buChar char="-"/>
+            </a:pPr>
+            <a:r>
+              <a:rPr lang="en-US" dirty="0"/>
+              <a:t>Play Game: This starts a new game of ‘</a:t>
+            </a:r>
+            <a:r>
+              <a:rPr lang="en-US" dirty="0" err="1"/>
+              <a:t>Sith</a:t>
+            </a:r>
+            <a:r>
+              <a:rPr lang="en-US" dirty="0"/>
+              <a:t>-Lord, Jedi, Ewok’</a:t>
+            </a:r>
+          </a:p>
+          <a:p>
+            <a:pPr marL="171450" indent="-171450">
+              <a:buFontTx/>
+              <a:buChar char="-"/>
+            </a:pPr>
+            <a:r>
+              <a:rPr lang="en-US" dirty="0"/>
+              <a:t>Read Rules: Displays the rules and scoring for the game</a:t>
+            </a:r>
+          </a:p>
+          <a:p>
+            <a:pPr marL="171450" indent="-171450">
+              <a:buFontTx/>
+              <a:buChar char="-"/>
+            </a:pPr>
+            <a:r>
+              <a:rPr lang="en-US" dirty="0"/>
+              <a:t>View Leaderboard: Displays the top 10 scores for previously played games. This includes a save feature which persists data in a YAML file after the application is quit so players always have access to their previous high scores on their local machine</a:t>
+            </a:r>
+          </a:p>
+          <a:p>
+            <a:pPr marL="171450" indent="-171450">
+              <a:buFontTx/>
+              <a:buChar char="-"/>
+            </a:pPr>
+            <a:r>
+              <a:rPr lang="en-US" dirty="0"/>
+              <a:t>Exit: Before exiting players are asked if they are sure they want to quit</a:t>
+            </a:r>
+          </a:p>
+          <a:p>
+            <a:endParaRPr lang="en-US" dirty="0"/>
+          </a:p>
+        </p:txBody>
+      </p:sp>
+      <p:sp>
+        <p:nvSpPr>
+          <p:cNvPr id="4" name="Slide Number Placeholder 3"/>
+          <p:cNvSpPr>
+            <a:spLocks noGrp="1"/>
+          </p:cNvSpPr>
+          <p:nvPr>
+            <p:ph type="sldNum" sz="quarter" idx="10"/>
+          </p:nvPr>
+        </p:nvSpPr>
+        <p:spPr/>
+        <p:txBody>
+          <a:bodyPr/>
+          <a:lstStyle/>
+          <a:p>
+            <a:fld id="{5FA8FB01-9704-264C-B39D-9A85F9662E5A}" type="slidenum">
+              <a:rPr lang="en-US" smtClean="0"/>
               <a:t>4</a:t>
             </a:fld>
             <a:endParaRPr lang="en-US"/>
@@ -541,6 +910,426 @@
     <p:extLst>
       <p:ext uri="{BB962C8B-B14F-4D97-AF65-F5344CB8AC3E}">
         <p14:creationId xmlns:p14="http://schemas.microsoft.com/office/powerpoint/2010/main" val="4101771616"/>
+      </p:ext>
+    </p:extLst>
+  </p:cSld>
+  <p:clrMapOvr>
+    <a:masterClrMapping/>
+  </p:clrMapOvr>
+</p:notes>
+</file>
+
+<file path=ppt/notesSlides/notesSlide5.xml><?xml version="1.0" encoding="utf-8"?>
+<p:notes xmlns:a="http://schemas.openxmlformats.org/drawingml/2006/main" xmlns:r="http://schemas.openxmlformats.org/officeDocument/2006/relationships" xmlns:p="http://schemas.openxmlformats.org/presentationml/2006/main">
+  <p:cSld>
+    <p:spTree>
+      <p:nvGrpSpPr>
+        <p:cNvPr id="1" name=""/>
+        <p:cNvGrpSpPr/>
+        <p:nvPr/>
+      </p:nvGrpSpPr>
+      <p:grpSpPr>
+        <a:xfrm>
+          <a:off x="0" y="0"/>
+          <a:ext cx="0" cy="0"/>
+          <a:chOff x="0" y="0"/>
+          <a:chExt cx="0" cy="0"/>
+        </a:xfrm>
+      </p:grpSpPr>
+      <p:sp>
+        <p:nvSpPr>
+          <p:cNvPr id="2" name="Slide Image Placeholder 1"/>
+          <p:cNvSpPr>
+            <a:spLocks noGrp="1" noRot="1" noChangeAspect="1"/>
+          </p:cNvSpPr>
+          <p:nvPr>
+            <p:ph type="sldImg"/>
+          </p:nvPr>
+        </p:nvSpPr>
+        <p:spPr/>
+      </p:sp>
+      <p:sp>
+        <p:nvSpPr>
+          <p:cNvPr id="3" name="Notes Placeholder 2"/>
+          <p:cNvSpPr>
+            <a:spLocks noGrp="1"/>
+          </p:cNvSpPr>
+          <p:nvPr>
+            <p:ph type="body" idx="1"/>
+          </p:nvPr>
+        </p:nvSpPr>
+        <p:spPr/>
+        <p:txBody>
+          <a:bodyPr/>
+          <a:lstStyle/>
+          <a:p>
+            <a:r>
+              <a:rPr lang="en-US" dirty="0"/>
+              <a:t>Here is a list of all the additional features I implemented to enhance the user experience while using the app or playing the game</a:t>
+            </a:r>
+          </a:p>
+        </p:txBody>
+      </p:sp>
+      <p:sp>
+        <p:nvSpPr>
+          <p:cNvPr id="4" name="Slide Number Placeholder 3"/>
+          <p:cNvSpPr>
+            <a:spLocks noGrp="1"/>
+          </p:cNvSpPr>
+          <p:nvPr>
+            <p:ph type="sldNum" sz="quarter" idx="10"/>
+          </p:nvPr>
+        </p:nvSpPr>
+        <p:spPr/>
+        <p:txBody>
+          <a:bodyPr/>
+          <a:lstStyle/>
+          <a:p>
+            <a:fld id="{5FA8FB01-9704-264C-B39D-9A85F9662E5A}" type="slidenum">
+              <a:rPr lang="en-US" smtClean="0"/>
+              <a:t>5</a:t>
+            </a:fld>
+            <a:endParaRPr lang="en-US"/>
+          </a:p>
+        </p:txBody>
+      </p:sp>
+    </p:spTree>
+    <p:extLst>
+      <p:ext uri="{BB962C8B-B14F-4D97-AF65-F5344CB8AC3E}">
+        <p14:creationId xmlns:p14="http://schemas.microsoft.com/office/powerpoint/2010/main" val="2368475015"/>
+      </p:ext>
+    </p:extLst>
+  </p:cSld>
+  <p:clrMapOvr>
+    <a:masterClrMapping/>
+  </p:clrMapOvr>
+</p:notes>
+</file>
+
+<file path=ppt/notesSlides/notesSlide6.xml><?xml version="1.0" encoding="utf-8"?>
+<p:notes xmlns:a="http://schemas.openxmlformats.org/drawingml/2006/main" xmlns:r="http://schemas.openxmlformats.org/officeDocument/2006/relationships" xmlns:p="http://schemas.openxmlformats.org/presentationml/2006/main">
+  <p:cSld>
+    <p:spTree>
+      <p:nvGrpSpPr>
+        <p:cNvPr id="1" name=""/>
+        <p:cNvGrpSpPr/>
+        <p:nvPr/>
+      </p:nvGrpSpPr>
+      <p:grpSpPr>
+        <a:xfrm>
+          <a:off x="0" y="0"/>
+          <a:ext cx="0" cy="0"/>
+          <a:chOff x="0" y="0"/>
+          <a:chExt cx="0" cy="0"/>
+        </a:xfrm>
+      </p:grpSpPr>
+      <p:sp>
+        <p:nvSpPr>
+          <p:cNvPr id="2" name="Slide Image Placeholder 1"/>
+          <p:cNvSpPr>
+            <a:spLocks noGrp="1" noRot="1" noChangeAspect="1"/>
+          </p:cNvSpPr>
+          <p:nvPr>
+            <p:ph type="sldImg"/>
+          </p:nvPr>
+        </p:nvSpPr>
+        <p:spPr/>
+      </p:sp>
+      <p:sp>
+        <p:nvSpPr>
+          <p:cNvPr id="3" name="Notes Placeholder 2"/>
+          <p:cNvSpPr>
+            <a:spLocks noGrp="1"/>
+          </p:cNvSpPr>
+          <p:nvPr>
+            <p:ph type="body" idx="1"/>
+          </p:nvPr>
+        </p:nvSpPr>
+        <p:spPr/>
+        <p:txBody>
+          <a:bodyPr/>
+          <a:lstStyle/>
+          <a:p>
+            <a:r>
+              <a:rPr lang="en-US" dirty="0"/>
+              <a:t>Challenges:</a:t>
+            </a:r>
+          </a:p>
+          <a:p>
+            <a:pPr marL="171450" indent="-171450">
+              <a:buFontTx/>
+              <a:buChar char="-"/>
+            </a:pPr>
+            <a:r>
+              <a:rPr lang="en-US" dirty="0"/>
+              <a:t>Lengthy Testing:</a:t>
+            </a:r>
+          </a:p>
+          <a:p>
+            <a:pPr marL="628650" lvl="1" indent="-171450">
+              <a:buFontTx/>
+              <a:buChar char="-"/>
+            </a:pPr>
+            <a:r>
+              <a:rPr lang="en-US" dirty="0"/>
+              <a:t>I initially tried to build my app under the Test Driven Development methodology, but due to limited experience building apps in Ruby I found this slowed my progress substantially as I wasn’t entirely sure how I was going to build the app before I got started</a:t>
+            </a:r>
+          </a:p>
+          <a:p>
+            <a:pPr marL="628650" lvl="1" indent="-171450">
+              <a:buFontTx/>
+              <a:buChar char="-"/>
+            </a:pPr>
+            <a:r>
+              <a:rPr lang="en-US" dirty="0"/>
+              <a:t>Once I abandoned this approach and just started building, I appeared to be saving a lot of time, but whenever I wanted to test a feature I had built I had to do it manually which ultimately would have taken longer than writing tests first (assuming I knew how to do this beforehand)</a:t>
+            </a:r>
+          </a:p>
+          <a:p>
+            <a:pPr marL="171450" lvl="0" indent="-171450">
+              <a:buFontTx/>
+              <a:buChar char="-"/>
+            </a:pPr>
+            <a:r>
+              <a:rPr lang="en-US" dirty="0"/>
+              <a:t>MVC:</a:t>
+            </a:r>
+          </a:p>
+          <a:p>
+            <a:pPr marL="628650" lvl="1" indent="-171450">
+              <a:buFontTx/>
+              <a:buChar char="-"/>
+            </a:pPr>
+            <a:r>
+              <a:rPr lang="en-US" dirty="0"/>
+              <a:t>I also tried building the app in an MVC structure from my first line of code, but I began running into some serious trouble getting the code to work and was wasting too much time with file structure and not building anything</a:t>
+            </a:r>
+          </a:p>
+          <a:p>
+            <a:pPr marL="628650" lvl="1" indent="-171450">
+              <a:buFontTx/>
+              <a:buChar char="-"/>
+            </a:pPr>
+            <a:r>
+              <a:rPr lang="en-US" dirty="0"/>
+              <a:t>Again I abandoned the ’best practice’ for app development temporarily to just get my code working which meant most of my code was being written in the controller and nothing was being ported to any view files</a:t>
+            </a:r>
+          </a:p>
+          <a:p>
+            <a:pPr marL="171450" lvl="0" indent="-171450">
+              <a:buFontTx/>
+              <a:buChar char="-"/>
+            </a:pPr>
+            <a:r>
+              <a:rPr lang="en-US" dirty="0"/>
+              <a:t>Require Loop Errors:</a:t>
+            </a:r>
+          </a:p>
+          <a:p>
+            <a:pPr marL="628650" lvl="1" indent="-171450">
+              <a:buFontTx/>
+              <a:buChar char="-"/>
+            </a:pPr>
+            <a:r>
+              <a:rPr lang="en-US" dirty="0"/>
+              <a:t>Once I had most of the basic functionality built I started moving all of the input/output tasks into view files. At first this was pretty simple as I could cut and paste chunks of code into new files and just point to them with </a:t>
+            </a:r>
+            <a:r>
+              <a:rPr lang="en-US" dirty="0" err="1"/>
+              <a:t>require_relative</a:t>
+            </a:r>
+            <a:r>
+              <a:rPr lang="en-US" dirty="0"/>
+              <a:t>.</a:t>
+            </a:r>
+          </a:p>
+          <a:p>
+            <a:pPr marL="628650" lvl="1" indent="-171450">
+              <a:buFontTx/>
+              <a:buChar char="-"/>
+            </a:pPr>
+            <a:r>
+              <a:rPr lang="en-US" dirty="0"/>
+              <a:t>What was challenging, however, was that I didn’t know how to hand data back to the controller correctly so I just tried to point the view files back at the controller which ended up creating an infinite loop and crashing the app.</a:t>
+            </a:r>
+          </a:p>
+          <a:p>
+            <a:pPr marL="628650" lvl="1" indent="-171450">
+              <a:buFontTx/>
+              <a:buChar char="-"/>
+            </a:pPr>
+            <a:r>
+              <a:rPr lang="en-US" dirty="0"/>
+              <a:t>I eventually realized I could just save the results of my View files to a local variable and then I was able to easily manipulate the data back in the controller (this will </a:t>
+            </a:r>
+            <a:r>
+              <a:rPr lang="en-US"/>
+              <a:t>become clearer </a:t>
+            </a:r>
+            <a:r>
+              <a:rPr lang="en-US" dirty="0"/>
+              <a:t>when I show an example in my code)</a:t>
+            </a:r>
+          </a:p>
+          <a:p>
+            <a:pPr marL="171450" lvl="0" indent="-171450">
+              <a:buFontTx/>
+              <a:buChar char="-"/>
+            </a:pPr>
+            <a:r>
+              <a:rPr lang="en-US" dirty="0"/>
+              <a:t>Scope Creep:</a:t>
+            </a:r>
+          </a:p>
+          <a:p>
+            <a:pPr marL="628650" lvl="1" indent="-171450">
+              <a:buFontTx/>
+              <a:buChar char="-"/>
+            </a:pPr>
+            <a:r>
+              <a:rPr lang="en-US" dirty="0"/>
+              <a:t>Once I had the basic functionality built, I had buckets of time before the deadline, and was avoiding having to work on the documentation, so I started building </a:t>
+            </a:r>
+            <a:r>
+              <a:rPr lang="en-US" dirty="0" err="1"/>
+              <a:t>tonnes</a:t>
+            </a:r>
+            <a:r>
+              <a:rPr lang="en-US" dirty="0"/>
+              <a:t> of small features to enhance the user experience</a:t>
+            </a:r>
+          </a:p>
+          <a:p>
+            <a:pPr marL="628650" lvl="1" indent="-171450">
+              <a:buFontTx/>
+              <a:buChar char="-"/>
+            </a:pPr>
+            <a:r>
+              <a:rPr lang="en-US" dirty="0"/>
+              <a:t>Without strict code requirements or a deadline, this problem would eventually get completely out of control. Luckily this assignment is due Sunday night</a:t>
+            </a:r>
+          </a:p>
+        </p:txBody>
+      </p:sp>
+      <p:sp>
+        <p:nvSpPr>
+          <p:cNvPr id="4" name="Slide Number Placeholder 3"/>
+          <p:cNvSpPr>
+            <a:spLocks noGrp="1"/>
+          </p:cNvSpPr>
+          <p:nvPr>
+            <p:ph type="sldNum" sz="quarter" idx="10"/>
+          </p:nvPr>
+        </p:nvSpPr>
+        <p:spPr/>
+        <p:txBody>
+          <a:bodyPr/>
+          <a:lstStyle/>
+          <a:p>
+            <a:fld id="{5FA8FB01-9704-264C-B39D-9A85F9662E5A}" type="slidenum">
+              <a:rPr lang="en-US" smtClean="0"/>
+              <a:t>6</a:t>
+            </a:fld>
+            <a:endParaRPr lang="en-US"/>
+          </a:p>
+        </p:txBody>
+      </p:sp>
+    </p:spTree>
+    <p:extLst>
+      <p:ext uri="{BB962C8B-B14F-4D97-AF65-F5344CB8AC3E}">
+        <p14:creationId xmlns:p14="http://schemas.microsoft.com/office/powerpoint/2010/main" val="3239836758"/>
+      </p:ext>
+    </p:extLst>
+  </p:cSld>
+  <p:clrMapOvr>
+    <a:masterClrMapping/>
+  </p:clrMapOvr>
+</p:notes>
+</file>
+
+<file path=ppt/notesSlides/notesSlide7.xml><?xml version="1.0" encoding="utf-8"?>
+<p:notes xmlns:a="http://schemas.openxmlformats.org/drawingml/2006/main" xmlns:r="http://schemas.openxmlformats.org/officeDocument/2006/relationships" xmlns:p="http://schemas.openxmlformats.org/presentationml/2006/main">
+  <p:cSld>
+    <p:spTree>
+      <p:nvGrpSpPr>
+        <p:cNvPr id="1" name=""/>
+        <p:cNvGrpSpPr/>
+        <p:nvPr/>
+      </p:nvGrpSpPr>
+      <p:grpSpPr>
+        <a:xfrm>
+          <a:off x="0" y="0"/>
+          <a:ext cx="0" cy="0"/>
+          <a:chOff x="0" y="0"/>
+          <a:chExt cx="0" cy="0"/>
+        </a:xfrm>
+      </p:grpSpPr>
+      <p:sp>
+        <p:nvSpPr>
+          <p:cNvPr id="2" name="Slide Image Placeholder 1"/>
+          <p:cNvSpPr>
+            <a:spLocks noGrp="1" noRot="1" noChangeAspect="1"/>
+          </p:cNvSpPr>
+          <p:nvPr>
+            <p:ph type="sldImg"/>
+          </p:nvPr>
+        </p:nvSpPr>
+        <p:spPr/>
+      </p:sp>
+      <p:sp>
+        <p:nvSpPr>
+          <p:cNvPr id="3" name="Notes Placeholder 2"/>
+          <p:cNvSpPr>
+            <a:spLocks noGrp="1"/>
+          </p:cNvSpPr>
+          <p:nvPr>
+            <p:ph type="body" idx="1"/>
+          </p:nvPr>
+        </p:nvSpPr>
+        <p:spPr/>
+        <p:txBody>
+          <a:bodyPr/>
+          <a:lstStyle/>
+          <a:p>
+            <a:r>
+              <a:rPr lang="en-US" dirty="0"/>
+              <a:t>Now that’s out of the way, who wants to see </a:t>
+            </a:r>
+            <a:r>
+              <a:rPr lang="en-US"/>
+              <a:t>a demo?</a:t>
+            </a:r>
+            <a:endParaRPr lang="en-US" dirty="0"/>
+          </a:p>
+        </p:txBody>
+      </p:sp>
+      <p:sp>
+        <p:nvSpPr>
+          <p:cNvPr id="4" name="Slide Number Placeholder 3"/>
+          <p:cNvSpPr>
+            <a:spLocks noGrp="1"/>
+          </p:cNvSpPr>
+          <p:nvPr>
+            <p:ph type="sldNum" sz="quarter" idx="10"/>
+          </p:nvPr>
+        </p:nvSpPr>
+        <p:spPr/>
+        <p:txBody>
+          <a:bodyPr/>
+          <a:lstStyle/>
+          <a:p>
+            <a:fld id="{5FA8FB01-9704-264C-B39D-9A85F9662E5A}" type="slidenum">
+              <a:rPr lang="en-US" smtClean="0"/>
+              <a:t>7</a:t>
+            </a:fld>
+            <a:endParaRPr lang="en-US"/>
+          </a:p>
+        </p:txBody>
+      </p:sp>
+    </p:spTree>
+    <p:extLst>
+      <p:ext uri="{BB962C8B-B14F-4D97-AF65-F5344CB8AC3E}">
+        <p14:creationId xmlns:p14="http://schemas.microsoft.com/office/powerpoint/2010/main" val="3191981052"/>
       </p:ext>
     </p:extLst>
   </p:cSld>
@@ -607,7 +1396,7 @@
           <a:noFill/>
           <a:extLst>
             <a:ext uri="{909E8E84-426E-40dd-AFC4-6F175D3DCCD1}">
-              <a14:hiddenFill xmlns:a14="http://schemas.microsoft.com/office/drawing/2010/main" xmlns="">
+              <a14:hiddenFill xmlns="" xmlns:a14="http://schemas.microsoft.com/office/drawing/2010/main">
                 <a:solidFill>
                   <a:srgbClr val="FFFFFF"/>
                 </a:solidFill>
@@ -667,7 +1456,7 @@
             </a:ln>
             <a:extLst>
               <a:ext uri="{91240B29-F687-4f45-9708-019B960494DF}">
-                <a14:hiddenLine xmlns:a14="http://schemas.microsoft.com/office/drawing/2010/main" xmlns="" w="9525">
+                <a14:hiddenLine xmlns="" xmlns:a14="http://schemas.microsoft.com/office/drawing/2010/main" w="9525">
                   <a:solidFill>
                     <a:srgbClr val="000000"/>
                   </a:solidFill>
@@ -757,7 +1546,7 @@
             </a:ln>
             <a:extLst>
               <a:ext uri="{91240B29-F687-4f45-9708-019B960494DF}">
-                <a14:hiddenLine xmlns:a14="http://schemas.microsoft.com/office/drawing/2010/main" xmlns="" w="9525">
+                <a14:hiddenLine xmlns="" xmlns:a14="http://schemas.microsoft.com/office/drawing/2010/main" w="9525">
                   <a:solidFill>
                     <a:srgbClr val="000000"/>
                   </a:solidFill>
@@ -847,7 +1636,7 @@
             </a:ln>
             <a:extLst>
               <a:ext uri="{91240B29-F687-4f45-9708-019B960494DF}">
-                <a14:hiddenLine xmlns:a14="http://schemas.microsoft.com/office/drawing/2010/main" xmlns="" w="9525">
+                <a14:hiddenLine xmlns="" xmlns:a14="http://schemas.microsoft.com/office/drawing/2010/main" w="9525">
                   <a:solidFill>
                     <a:srgbClr val="000000"/>
                   </a:solidFill>
@@ -881,7 +1670,7 @@
             </a:ln>
             <a:extLst>
               <a:ext uri="{91240B29-F687-4f45-9708-019B960494DF}">
-                <a14:hiddenLine xmlns:a14="http://schemas.microsoft.com/office/drawing/2010/main" xmlns="" w="9525">
+                <a14:hiddenLine xmlns="" xmlns:a14="http://schemas.microsoft.com/office/drawing/2010/main" w="9525">
                   <a:solidFill>
                     <a:srgbClr val="000000"/>
                   </a:solidFill>
@@ -971,7 +1760,7 @@
             </a:ln>
             <a:extLst>
               <a:ext uri="{91240B29-F687-4f45-9708-019B960494DF}">
-                <a14:hiddenLine xmlns:a14="http://schemas.microsoft.com/office/drawing/2010/main" xmlns="" w="9525">
+                <a14:hiddenLine xmlns="" xmlns:a14="http://schemas.microsoft.com/office/drawing/2010/main" w="9525">
                   <a:solidFill>
                     <a:srgbClr val="000000"/>
                   </a:solidFill>
@@ -1033,7 +1822,7 @@
             </a:ln>
             <a:extLst>
               <a:ext uri="{91240B29-F687-4f45-9708-019B960494DF}">
-                <a14:hiddenLine xmlns:a14="http://schemas.microsoft.com/office/drawing/2010/main" xmlns="" w="9525">
+                <a14:hiddenLine xmlns="" xmlns:a14="http://schemas.microsoft.com/office/drawing/2010/main" w="9525">
                   <a:solidFill>
                     <a:srgbClr val="000000"/>
                   </a:solidFill>
@@ -1095,7 +1884,7 @@
             </a:ln>
             <a:extLst>
               <a:ext uri="{91240B29-F687-4f45-9708-019B960494DF}">
-                <a14:hiddenLine xmlns:a14="http://schemas.microsoft.com/office/drawing/2010/main" xmlns="" w="9525">
+                <a14:hiddenLine xmlns="" xmlns:a14="http://schemas.microsoft.com/office/drawing/2010/main" w="9525">
                   <a:solidFill>
                     <a:srgbClr val="000000"/>
                   </a:solidFill>
@@ -1185,7 +1974,7 @@
             </a:ln>
             <a:extLst>
               <a:ext uri="{91240B29-F687-4f45-9708-019B960494DF}">
-                <a14:hiddenLine xmlns:a14="http://schemas.microsoft.com/office/drawing/2010/main" xmlns="" w="9525">
+                <a14:hiddenLine xmlns="" xmlns:a14="http://schemas.microsoft.com/office/drawing/2010/main" w="9525">
                   <a:solidFill>
                     <a:srgbClr val="000000"/>
                   </a:solidFill>
@@ -1247,7 +2036,7 @@
             </a:ln>
             <a:extLst>
               <a:ext uri="{91240B29-F687-4f45-9708-019B960494DF}">
-                <a14:hiddenLine xmlns:a14="http://schemas.microsoft.com/office/drawing/2010/main" xmlns="" w="9525">
+                <a14:hiddenLine xmlns="" xmlns:a14="http://schemas.microsoft.com/office/drawing/2010/main" w="9525">
                   <a:solidFill>
                     <a:srgbClr val="000000"/>
                   </a:solidFill>
@@ -1309,7 +2098,7 @@
             </a:ln>
             <a:extLst>
               <a:ext uri="{91240B29-F687-4f45-9708-019B960494DF}">
-                <a14:hiddenLine xmlns:a14="http://schemas.microsoft.com/office/drawing/2010/main" xmlns="" w="9525">
+                <a14:hiddenLine xmlns="" xmlns:a14="http://schemas.microsoft.com/office/drawing/2010/main" w="9525">
                   <a:solidFill>
                     <a:srgbClr val="000000"/>
                   </a:solidFill>
@@ -1399,7 +2188,7 @@
             </a:ln>
             <a:extLst>
               <a:ext uri="{91240B29-F687-4f45-9708-019B960494DF}">
-                <a14:hiddenLine xmlns:a14="http://schemas.microsoft.com/office/drawing/2010/main" xmlns="" w="9525">
+                <a14:hiddenLine xmlns="" xmlns:a14="http://schemas.microsoft.com/office/drawing/2010/main" w="9525">
                   <a:solidFill>
                     <a:srgbClr val="000000"/>
                   </a:solidFill>
@@ -1489,7 +2278,7 @@
             </a:ln>
             <a:extLst>
               <a:ext uri="{91240B29-F687-4f45-9708-019B960494DF}">
-                <a14:hiddenLine xmlns:a14="http://schemas.microsoft.com/office/drawing/2010/main" xmlns="" w="9525">
+                <a14:hiddenLine xmlns="" xmlns:a14="http://schemas.microsoft.com/office/drawing/2010/main" w="9525">
                   <a:solidFill>
                     <a:srgbClr val="000000"/>
                   </a:solidFill>
@@ -1551,7 +2340,7 @@
             </a:ln>
             <a:extLst>
               <a:ext uri="{91240B29-F687-4f45-9708-019B960494DF}">
-                <a14:hiddenLine xmlns:a14="http://schemas.microsoft.com/office/drawing/2010/main" xmlns="" w="9525">
+                <a14:hiddenLine xmlns="" xmlns:a14="http://schemas.microsoft.com/office/drawing/2010/main" w="9525">
                   <a:solidFill>
                     <a:srgbClr val="000000"/>
                   </a:solidFill>
@@ -1661,7 +2450,7 @@
             </a:ln>
             <a:extLst>
               <a:ext uri="{91240B29-F687-4f45-9708-019B960494DF}">
-                <a14:hiddenLine xmlns:a14="http://schemas.microsoft.com/office/drawing/2010/main" xmlns="" w="9525">
+                <a14:hiddenLine xmlns="" xmlns:a14="http://schemas.microsoft.com/office/drawing/2010/main" w="9525">
                   <a:solidFill>
                     <a:srgbClr val="000000"/>
                   </a:solidFill>
@@ -1723,7 +2512,7 @@
             </a:ln>
             <a:extLst>
               <a:ext uri="{91240B29-F687-4f45-9708-019B960494DF}">
-                <a14:hiddenLine xmlns:a14="http://schemas.microsoft.com/office/drawing/2010/main" xmlns="" w="9525">
+                <a14:hiddenLine xmlns="" xmlns:a14="http://schemas.microsoft.com/office/drawing/2010/main" w="9525">
                   <a:solidFill>
                     <a:srgbClr val="000000"/>
                   </a:solidFill>
@@ -1813,7 +2602,7 @@
             </a:ln>
             <a:extLst>
               <a:ext uri="{91240B29-F687-4f45-9708-019B960494DF}">
-                <a14:hiddenLine xmlns:a14="http://schemas.microsoft.com/office/drawing/2010/main" xmlns="" w="9525">
+                <a14:hiddenLine xmlns="" xmlns:a14="http://schemas.microsoft.com/office/drawing/2010/main" w="9525">
                   <a:solidFill>
                     <a:srgbClr val="000000"/>
                   </a:solidFill>
@@ -1903,7 +2692,7 @@
             </a:ln>
             <a:extLst>
               <a:ext uri="{91240B29-F687-4f45-9708-019B960494DF}">
-                <a14:hiddenLine xmlns:a14="http://schemas.microsoft.com/office/drawing/2010/main" xmlns="" w="9525">
+                <a14:hiddenLine xmlns="" xmlns:a14="http://schemas.microsoft.com/office/drawing/2010/main" w="9525">
                   <a:solidFill>
                     <a:srgbClr val="000000"/>
                   </a:solidFill>
@@ -1965,7 +2754,7 @@
             </a:ln>
             <a:extLst>
               <a:ext uri="{91240B29-F687-4f45-9708-019B960494DF}">
-                <a14:hiddenLine xmlns:a14="http://schemas.microsoft.com/office/drawing/2010/main" xmlns="" w="9525">
+                <a14:hiddenLine xmlns="" xmlns:a14="http://schemas.microsoft.com/office/drawing/2010/main" w="9525">
                   <a:solidFill>
                     <a:srgbClr val="000000"/>
                   </a:solidFill>
@@ -2055,7 +2844,7 @@
             </a:ln>
             <a:extLst>
               <a:ext uri="{91240B29-F687-4f45-9708-019B960494DF}">
-                <a14:hiddenLine xmlns:a14="http://schemas.microsoft.com/office/drawing/2010/main" xmlns="" w="9525">
+                <a14:hiddenLine xmlns="" xmlns:a14="http://schemas.microsoft.com/office/drawing/2010/main" w="9525">
                   <a:solidFill>
                     <a:srgbClr val="000000"/>
                   </a:solidFill>
@@ -2145,7 +2934,7 @@
             </a:ln>
             <a:extLst>
               <a:ext uri="{91240B29-F687-4f45-9708-019B960494DF}">
-                <a14:hiddenLine xmlns:a14="http://schemas.microsoft.com/office/drawing/2010/main" xmlns="" w="9525">
+                <a14:hiddenLine xmlns="" xmlns:a14="http://schemas.microsoft.com/office/drawing/2010/main" w="9525">
                   <a:solidFill>
                     <a:srgbClr val="000000"/>
                   </a:solidFill>
@@ -2201,7 +2990,7 @@
             </a:ln>
             <a:extLst>
               <a:ext uri="{91240B29-F687-4f45-9708-019B960494DF}">
-                <a14:hiddenLine xmlns:a14="http://schemas.microsoft.com/office/drawing/2010/main" xmlns="" w="9525">
+                <a14:hiddenLine xmlns="" xmlns:a14="http://schemas.microsoft.com/office/drawing/2010/main" w="9525">
                   <a:solidFill>
                     <a:srgbClr val="000000"/>
                   </a:solidFill>
@@ -2291,7 +3080,7 @@
             </a:ln>
             <a:extLst>
               <a:ext uri="{91240B29-F687-4f45-9708-019B960494DF}">
-                <a14:hiddenLine xmlns:a14="http://schemas.microsoft.com/office/drawing/2010/main" xmlns="" w="9525">
+                <a14:hiddenLine xmlns="" xmlns:a14="http://schemas.microsoft.com/office/drawing/2010/main" w="9525">
                   <a:solidFill>
                     <a:srgbClr val="000000"/>
                   </a:solidFill>
@@ -2347,7 +3136,7 @@
             </a:ln>
             <a:extLst>
               <a:ext uri="{91240B29-F687-4f45-9708-019B960494DF}">
-                <a14:hiddenLine xmlns:a14="http://schemas.microsoft.com/office/drawing/2010/main" xmlns="" w="9525">
+                <a14:hiddenLine xmlns="" xmlns:a14="http://schemas.microsoft.com/office/drawing/2010/main" w="9525">
                   <a:solidFill>
                     <a:srgbClr val="000000"/>
                   </a:solidFill>
@@ -2437,7 +3226,7 @@
             </a:ln>
             <a:extLst>
               <a:ext uri="{91240B29-F687-4f45-9708-019B960494DF}">
-                <a14:hiddenLine xmlns:a14="http://schemas.microsoft.com/office/drawing/2010/main" xmlns="" w="9525">
+                <a14:hiddenLine xmlns="" xmlns:a14="http://schemas.microsoft.com/office/drawing/2010/main" w="9525">
                   <a:solidFill>
                     <a:srgbClr val="000000"/>
                   </a:solidFill>
@@ -2505,7 +3294,7 @@
             </a:ln>
             <a:extLst>
               <a:ext uri="{91240B29-F687-4f45-9708-019B960494DF}">
-                <a14:hiddenLine xmlns:a14="http://schemas.microsoft.com/office/drawing/2010/main" xmlns="" w="9525">
+                <a14:hiddenLine xmlns="" xmlns:a14="http://schemas.microsoft.com/office/drawing/2010/main" w="9525">
                   <a:solidFill>
                     <a:srgbClr val="000000"/>
                   </a:solidFill>
@@ -2595,7 +3384,7 @@
             </a:ln>
             <a:extLst>
               <a:ext uri="{91240B29-F687-4f45-9708-019B960494DF}">
-                <a14:hiddenLine xmlns:a14="http://schemas.microsoft.com/office/drawing/2010/main" xmlns="" w="9525">
+                <a14:hiddenLine xmlns="" xmlns:a14="http://schemas.microsoft.com/office/drawing/2010/main" w="9525">
                   <a:solidFill>
                     <a:srgbClr val="000000"/>
                   </a:solidFill>
@@ -2663,7 +3452,7 @@
             </a:ln>
             <a:extLst>
               <a:ext uri="{91240B29-F687-4f45-9708-019B960494DF}">
-                <a14:hiddenLine xmlns:a14="http://schemas.microsoft.com/office/drawing/2010/main" xmlns="" w="9525">
+                <a14:hiddenLine xmlns="" xmlns:a14="http://schemas.microsoft.com/office/drawing/2010/main" w="9525">
                   <a:solidFill>
                     <a:srgbClr val="000000"/>
                   </a:solidFill>
@@ -2753,7 +3542,7 @@
             </a:ln>
             <a:extLst>
               <a:ext uri="{91240B29-F687-4f45-9708-019B960494DF}">
-                <a14:hiddenLine xmlns:a14="http://schemas.microsoft.com/office/drawing/2010/main" xmlns="" w="9525">
+                <a14:hiddenLine xmlns="" xmlns:a14="http://schemas.microsoft.com/office/drawing/2010/main" w="9525">
                   <a:solidFill>
                     <a:srgbClr val="000000"/>
                   </a:solidFill>
@@ -2787,7 +3576,7 @@
             </a:ln>
             <a:extLst>
               <a:ext uri="{91240B29-F687-4f45-9708-019B960494DF}">
-                <a14:hiddenLine xmlns:a14="http://schemas.microsoft.com/office/drawing/2010/main" xmlns="" w="9525">
+                <a14:hiddenLine xmlns="" xmlns:a14="http://schemas.microsoft.com/office/drawing/2010/main" w="9525">
                   <a:solidFill>
                     <a:srgbClr val="000000"/>
                   </a:solidFill>
@@ -2877,7 +3666,7 @@
             </a:ln>
             <a:extLst>
               <a:ext uri="{91240B29-F687-4f45-9708-019B960494DF}">
-                <a14:hiddenLine xmlns:a14="http://schemas.microsoft.com/office/drawing/2010/main" xmlns="" w="9525">
+                <a14:hiddenLine xmlns="" xmlns:a14="http://schemas.microsoft.com/office/drawing/2010/main" w="9525">
                   <a:solidFill>
                     <a:srgbClr val="000000"/>
                   </a:solidFill>
@@ -2939,7 +3728,7 @@
             </a:ln>
             <a:extLst>
               <a:ext uri="{91240B29-F687-4f45-9708-019B960494DF}">
-                <a14:hiddenLine xmlns:a14="http://schemas.microsoft.com/office/drawing/2010/main" xmlns="" w="9525">
+                <a14:hiddenLine xmlns="" xmlns:a14="http://schemas.microsoft.com/office/drawing/2010/main" w="9525">
                   <a:solidFill>
                     <a:srgbClr val="000000"/>
                   </a:solidFill>
@@ -3001,7 +3790,7 @@
             </a:ln>
             <a:extLst>
               <a:ext uri="{91240B29-F687-4f45-9708-019B960494DF}">
-                <a14:hiddenLine xmlns:a14="http://schemas.microsoft.com/office/drawing/2010/main" xmlns="" w="9525">
+                <a14:hiddenLine xmlns="" xmlns:a14="http://schemas.microsoft.com/office/drawing/2010/main" w="9525">
                   <a:solidFill>
                     <a:srgbClr val="000000"/>
                   </a:solidFill>
@@ -3091,7 +3880,7 @@
             </a:ln>
             <a:extLst>
               <a:ext uri="{91240B29-F687-4f45-9708-019B960494DF}">
-                <a14:hiddenLine xmlns:a14="http://schemas.microsoft.com/office/drawing/2010/main" xmlns="" w="9525">
+                <a14:hiddenLine xmlns="" xmlns:a14="http://schemas.microsoft.com/office/drawing/2010/main" w="9525">
                   <a:solidFill>
                     <a:srgbClr val="000000"/>
                   </a:solidFill>
@@ -3159,7 +3948,7 @@
             </a:ln>
             <a:extLst>
               <a:ext uri="{91240B29-F687-4f45-9708-019B960494DF}">
-                <a14:hiddenLine xmlns:a14="http://schemas.microsoft.com/office/drawing/2010/main" xmlns="" w="9525">
+                <a14:hiddenLine xmlns="" xmlns:a14="http://schemas.microsoft.com/office/drawing/2010/main" w="9525">
                   <a:solidFill>
                     <a:srgbClr val="000000"/>
                   </a:solidFill>
@@ -3221,7 +4010,7 @@
             </a:ln>
             <a:extLst>
               <a:ext uri="{91240B29-F687-4f45-9708-019B960494DF}">
-                <a14:hiddenLine xmlns:a14="http://schemas.microsoft.com/office/drawing/2010/main" xmlns="" w="9525">
+                <a14:hiddenLine xmlns="" xmlns:a14="http://schemas.microsoft.com/office/drawing/2010/main" w="9525">
                   <a:solidFill>
                     <a:srgbClr val="000000"/>
                   </a:solidFill>
@@ -3311,7 +4100,7 @@
             </a:ln>
             <a:extLst>
               <a:ext uri="{91240B29-F687-4f45-9708-019B960494DF}">
-                <a14:hiddenLine xmlns:a14="http://schemas.microsoft.com/office/drawing/2010/main" xmlns="" w="9525">
+                <a14:hiddenLine xmlns="" xmlns:a14="http://schemas.microsoft.com/office/drawing/2010/main" w="9525">
                   <a:solidFill>
                     <a:srgbClr val="000000"/>
                   </a:solidFill>
@@ -3373,7 +4162,7 @@
             </a:ln>
             <a:extLst>
               <a:ext uri="{91240B29-F687-4f45-9708-019B960494DF}">
-                <a14:hiddenLine xmlns:a14="http://schemas.microsoft.com/office/drawing/2010/main" xmlns="" w="9525">
+                <a14:hiddenLine xmlns="" xmlns:a14="http://schemas.microsoft.com/office/drawing/2010/main" w="9525">
                   <a:solidFill>
                     <a:srgbClr val="000000"/>
                   </a:solidFill>
@@ -3463,7 +4252,7 @@
             </a:ln>
             <a:extLst>
               <a:ext uri="{91240B29-F687-4f45-9708-019B960494DF}">
-                <a14:hiddenLine xmlns:a14="http://schemas.microsoft.com/office/drawing/2010/main" xmlns="" w="9525">
+                <a14:hiddenLine xmlns="" xmlns:a14="http://schemas.microsoft.com/office/drawing/2010/main" w="9525">
                   <a:solidFill>
                     <a:srgbClr val="000000"/>
                   </a:solidFill>
@@ -3525,7 +4314,7 @@
             </a:ln>
             <a:extLst>
               <a:ext uri="{91240B29-F687-4f45-9708-019B960494DF}">
-                <a14:hiddenLine xmlns:a14="http://schemas.microsoft.com/office/drawing/2010/main" xmlns="" w="9525">
+                <a14:hiddenLine xmlns="" xmlns:a14="http://schemas.microsoft.com/office/drawing/2010/main" w="9525">
                   <a:solidFill>
                     <a:srgbClr val="000000"/>
                   </a:solidFill>
@@ -3615,7 +4404,7 @@
             </a:ln>
             <a:extLst>
               <a:ext uri="{91240B29-F687-4f45-9708-019B960494DF}">
-                <a14:hiddenLine xmlns:a14="http://schemas.microsoft.com/office/drawing/2010/main" xmlns="" w="9525">
+                <a14:hiddenLine xmlns="" xmlns:a14="http://schemas.microsoft.com/office/drawing/2010/main" w="9525">
                   <a:solidFill>
                     <a:srgbClr val="000000"/>
                   </a:solidFill>
@@ -3649,7 +4438,7 @@
             </a:ln>
             <a:extLst>
               <a:ext uri="{91240B29-F687-4f45-9708-019B960494DF}">
-                <a14:hiddenLine xmlns:a14="http://schemas.microsoft.com/office/drawing/2010/main" xmlns="" w="9525">
+                <a14:hiddenLine xmlns="" xmlns:a14="http://schemas.microsoft.com/office/drawing/2010/main" w="9525">
                   <a:solidFill>
                     <a:srgbClr val="000000"/>
                   </a:solidFill>
@@ -3714,7 +4503,7 @@
             </a:ln>
             <a:extLst>
               <a:ext uri="{91240B29-F687-4f45-9708-019B960494DF}">
-                <a14:hiddenLine xmlns:a14="http://schemas.microsoft.com/office/drawing/2010/main" xmlns="" w="9525">
+                <a14:hiddenLine xmlns="" xmlns:a14="http://schemas.microsoft.com/office/drawing/2010/main" w="9525">
                   <a:solidFill>
                     <a:srgbClr val="000000"/>
                   </a:solidFill>
@@ -3804,7 +4593,7 @@
             </a:ln>
             <a:extLst>
               <a:ext uri="{91240B29-F687-4f45-9708-019B960494DF}">
-                <a14:hiddenLine xmlns:a14="http://schemas.microsoft.com/office/drawing/2010/main" xmlns="" w="9525">
+                <a14:hiddenLine xmlns="" xmlns:a14="http://schemas.microsoft.com/office/drawing/2010/main" w="9525">
                   <a:solidFill>
                     <a:srgbClr val="000000"/>
                   </a:solidFill>
@@ -3866,7 +4655,7 @@
             </a:ln>
             <a:extLst>
               <a:ext uri="{91240B29-F687-4f45-9708-019B960494DF}">
-                <a14:hiddenLine xmlns:a14="http://schemas.microsoft.com/office/drawing/2010/main" xmlns="" w="9525">
+                <a14:hiddenLine xmlns="" xmlns:a14="http://schemas.microsoft.com/office/drawing/2010/main" w="9525">
                   <a:solidFill>
                     <a:srgbClr val="000000"/>
                   </a:solidFill>
@@ -3956,7 +4745,7 @@
             </a:ln>
             <a:extLst>
               <a:ext uri="{91240B29-F687-4f45-9708-019B960494DF}">
-                <a14:hiddenLine xmlns:a14="http://schemas.microsoft.com/office/drawing/2010/main" xmlns="" w="9525">
+                <a14:hiddenLine xmlns="" xmlns:a14="http://schemas.microsoft.com/office/drawing/2010/main" w="9525">
                   <a:solidFill>
                     <a:srgbClr val="000000"/>
                   </a:solidFill>
@@ -4046,7 +4835,7 @@
             </a:ln>
             <a:extLst>
               <a:ext uri="{91240B29-F687-4f45-9708-019B960494DF}">
-                <a14:hiddenLine xmlns:a14="http://schemas.microsoft.com/office/drawing/2010/main" xmlns="" w="9525">
+                <a14:hiddenLine xmlns="" xmlns:a14="http://schemas.microsoft.com/office/drawing/2010/main" w="9525">
                   <a:solidFill>
                     <a:srgbClr val="000000"/>
                   </a:solidFill>
@@ -4111,7 +4900,7 @@
             </a:ln>
             <a:extLst>
               <a:ext uri="{91240B29-F687-4f45-9708-019B960494DF}">
-                <a14:hiddenLine xmlns:a14="http://schemas.microsoft.com/office/drawing/2010/main" xmlns="" w="9525">
+                <a14:hiddenLine xmlns="" xmlns:a14="http://schemas.microsoft.com/office/drawing/2010/main" w="9525">
                   <a:solidFill>
                     <a:srgbClr val="000000"/>
                   </a:solidFill>
@@ -4173,7 +4962,7 @@
             </a:ln>
             <a:extLst>
               <a:ext uri="{91240B29-F687-4f45-9708-019B960494DF}">
-                <a14:hiddenLine xmlns:a14="http://schemas.microsoft.com/office/drawing/2010/main" xmlns="" w="9525">
+                <a14:hiddenLine xmlns="" xmlns:a14="http://schemas.microsoft.com/office/drawing/2010/main" w="9525">
                   <a:solidFill>
                     <a:srgbClr val="000000"/>
                   </a:solidFill>
@@ -4263,7 +5052,7 @@
             </a:ln>
             <a:extLst>
               <a:ext uri="{91240B29-F687-4f45-9708-019B960494DF}">
-                <a14:hiddenLine xmlns:a14="http://schemas.microsoft.com/office/drawing/2010/main" xmlns="" w="9525">
+                <a14:hiddenLine xmlns="" xmlns:a14="http://schemas.microsoft.com/office/drawing/2010/main" w="9525">
                   <a:solidFill>
                     <a:srgbClr val="000000"/>
                   </a:solidFill>
@@ -4353,7 +5142,7 @@
             </a:ln>
             <a:extLst>
               <a:ext uri="{91240B29-F687-4f45-9708-019B960494DF}">
-                <a14:hiddenLine xmlns:a14="http://schemas.microsoft.com/office/drawing/2010/main" xmlns="" w="9525">
+                <a14:hiddenLine xmlns="" xmlns:a14="http://schemas.microsoft.com/office/drawing/2010/main" w="9525">
                   <a:solidFill>
                     <a:srgbClr val="000000"/>
                   </a:solidFill>
@@ -4415,7 +5204,7 @@
             </a:ln>
             <a:extLst>
               <a:ext uri="{91240B29-F687-4f45-9708-019B960494DF}">
-                <a14:hiddenLine xmlns:a14="http://schemas.microsoft.com/office/drawing/2010/main" xmlns="" w="9525">
+                <a14:hiddenLine xmlns="" xmlns:a14="http://schemas.microsoft.com/office/drawing/2010/main" w="9525">
                   <a:solidFill>
                     <a:srgbClr val="000000"/>
                   </a:solidFill>
@@ -4535,7 +5324,7 @@
             </a:ln>
             <a:extLst>
               <a:ext uri="{91240B29-F687-4f45-9708-019B960494DF}">
-                <a14:hiddenLine xmlns:a14="http://schemas.microsoft.com/office/drawing/2010/main" xmlns="" w="9525">
+                <a14:hiddenLine xmlns="" xmlns:a14="http://schemas.microsoft.com/office/drawing/2010/main" w="9525">
                   <a:solidFill>
                     <a:srgbClr val="000000"/>
                   </a:solidFill>
@@ -4603,7 +5392,7 @@
             </a:ln>
             <a:extLst>
               <a:ext uri="{91240B29-F687-4f45-9708-019B960494DF}">
-                <a14:hiddenLine xmlns:a14="http://schemas.microsoft.com/office/drawing/2010/main" xmlns="" w="9525">
+                <a14:hiddenLine xmlns="" xmlns:a14="http://schemas.microsoft.com/office/drawing/2010/main" w="9525">
                   <a:solidFill>
                     <a:srgbClr val="000000"/>
                   </a:solidFill>
@@ -4693,7 +5482,7 @@
             </a:ln>
             <a:extLst>
               <a:ext uri="{91240B29-F687-4f45-9708-019B960494DF}">
-                <a14:hiddenLine xmlns:a14="http://schemas.microsoft.com/office/drawing/2010/main" xmlns="" w="9525">
+                <a14:hiddenLine xmlns="" xmlns:a14="http://schemas.microsoft.com/office/drawing/2010/main" w="9525">
                   <a:solidFill>
                     <a:srgbClr val="000000"/>
                   </a:solidFill>
@@ -9507,7 +10296,7 @@
           <a:noFill/>
           <a:extLst>
             <a:ext uri="{909E8E84-426E-40dd-AFC4-6F175D3DCCD1}">
-              <a14:hiddenFill xmlns:a14="http://schemas.microsoft.com/office/drawing/2010/main" xmlns="">
+              <a14:hiddenFill xmlns="" xmlns:a14="http://schemas.microsoft.com/office/drawing/2010/main">
                 <a:solidFill>
                   <a:srgbClr val="FFFFFF"/>
                 </a:solidFill>
@@ -9581,7 +10370,7 @@
               </a:ln>
               <a:extLst>
                 <a:ext uri="{91240B29-F687-4f45-9708-019B960494DF}">
-                  <a14:hiddenLine xmlns:a14="http://schemas.microsoft.com/office/drawing/2010/main" xmlns="" w="9525">
+                  <a14:hiddenLine xmlns="" xmlns:a14="http://schemas.microsoft.com/office/drawing/2010/main" w="9525">
                     <a:solidFill>
                       <a:srgbClr val="000000"/>
                     </a:solidFill>
@@ -9671,7 +10460,7 @@
               </a:ln>
               <a:extLst>
                 <a:ext uri="{91240B29-F687-4f45-9708-019B960494DF}">
-                  <a14:hiddenLine xmlns:a14="http://schemas.microsoft.com/office/drawing/2010/main" xmlns="" w="9525">
+                  <a14:hiddenLine xmlns="" xmlns:a14="http://schemas.microsoft.com/office/drawing/2010/main" w="9525">
                     <a:solidFill>
                       <a:srgbClr val="000000"/>
                     </a:solidFill>
@@ -9761,7 +10550,7 @@
               </a:ln>
               <a:extLst>
                 <a:ext uri="{91240B29-F687-4f45-9708-019B960494DF}">
-                  <a14:hiddenLine xmlns:a14="http://schemas.microsoft.com/office/drawing/2010/main" xmlns="" w="9525">
+                  <a14:hiddenLine xmlns="" xmlns:a14="http://schemas.microsoft.com/office/drawing/2010/main" w="9525">
                     <a:solidFill>
                       <a:srgbClr val="000000"/>
                     </a:solidFill>
@@ -9823,7 +10612,7 @@
               </a:ln>
               <a:extLst>
                 <a:ext uri="{91240B29-F687-4f45-9708-019B960494DF}">
-                  <a14:hiddenLine xmlns:a14="http://schemas.microsoft.com/office/drawing/2010/main" xmlns="" w="9525">
+                  <a14:hiddenLine xmlns="" xmlns:a14="http://schemas.microsoft.com/office/drawing/2010/main" w="9525">
                     <a:solidFill>
                       <a:srgbClr val="000000"/>
                     </a:solidFill>
@@ -9913,7 +10702,7 @@
               </a:ln>
               <a:extLst>
                 <a:ext uri="{91240B29-F687-4f45-9708-019B960494DF}">
-                  <a14:hiddenLine xmlns:a14="http://schemas.microsoft.com/office/drawing/2010/main" xmlns="" w="9525">
+                  <a14:hiddenLine xmlns="" xmlns:a14="http://schemas.microsoft.com/office/drawing/2010/main" w="9525">
                     <a:solidFill>
                       <a:srgbClr val="000000"/>
                     </a:solidFill>
@@ -9975,7 +10764,7 @@
               </a:ln>
               <a:extLst>
                 <a:ext uri="{91240B29-F687-4f45-9708-019B960494DF}">
-                  <a14:hiddenLine xmlns:a14="http://schemas.microsoft.com/office/drawing/2010/main" xmlns="" w="9525">
+                  <a14:hiddenLine xmlns="" xmlns:a14="http://schemas.microsoft.com/office/drawing/2010/main" w="9525">
                     <a:solidFill>
                       <a:srgbClr val="000000"/>
                     </a:solidFill>
@@ -10037,7 +10826,7 @@
               </a:ln>
               <a:extLst>
                 <a:ext uri="{91240B29-F687-4f45-9708-019B960494DF}">
-                  <a14:hiddenLine xmlns:a14="http://schemas.microsoft.com/office/drawing/2010/main" xmlns="" w="9525">
+                  <a14:hiddenLine xmlns="" xmlns:a14="http://schemas.microsoft.com/office/drawing/2010/main" w="9525">
                     <a:solidFill>
                       <a:srgbClr val="000000"/>
                     </a:solidFill>
@@ -10127,7 +10916,7 @@
               </a:ln>
               <a:extLst>
                 <a:ext uri="{91240B29-F687-4f45-9708-019B960494DF}">
-                  <a14:hiddenLine xmlns:a14="http://schemas.microsoft.com/office/drawing/2010/main" xmlns="" w="9525">
+                  <a14:hiddenLine xmlns="" xmlns:a14="http://schemas.microsoft.com/office/drawing/2010/main" w="9525">
                     <a:solidFill>
                       <a:srgbClr val="000000"/>
                     </a:solidFill>
@@ -10217,7 +11006,7 @@
               </a:ln>
               <a:extLst>
                 <a:ext uri="{91240B29-F687-4f45-9708-019B960494DF}">
-                  <a14:hiddenLine xmlns:a14="http://schemas.microsoft.com/office/drawing/2010/main" xmlns="" w="9525">
+                  <a14:hiddenLine xmlns="" xmlns:a14="http://schemas.microsoft.com/office/drawing/2010/main" w="9525">
                     <a:solidFill>
                       <a:srgbClr val="000000"/>
                     </a:solidFill>
@@ -10279,7 +11068,7 @@
               </a:ln>
               <a:extLst>
                 <a:ext uri="{91240B29-F687-4f45-9708-019B960494DF}">
-                  <a14:hiddenLine xmlns:a14="http://schemas.microsoft.com/office/drawing/2010/main" xmlns="" w="9525">
+                  <a14:hiddenLine xmlns="" xmlns:a14="http://schemas.microsoft.com/office/drawing/2010/main" w="9525">
                     <a:solidFill>
                       <a:srgbClr val="000000"/>
                     </a:solidFill>
@@ -10389,7 +11178,7 @@
               </a:ln>
               <a:extLst>
                 <a:ext uri="{91240B29-F687-4f45-9708-019B960494DF}">
-                  <a14:hiddenLine xmlns:a14="http://schemas.microsoft.com/office/drawing/2010/main" xmlns="" w="9525">
+                  <a14:hiddenLine xmlns="" xmlns:a14="http://schemas.microsoft.com/office/drawing/2010/main" w="9525">
                     <a:solidFill>
                       <a:srgbClr val="000000"/>
                     </a:solidFill>
@@ -10473,7 +11262,7 @@
               </a:ln>
               <a:extLst>
                 <a:ext uri="{91240B29-F687-4f45-9708-019B960494DF}">
-                  <a14:hiddenLine xmlns:a14="http://schemas.microsoft.com/office/drawing/2010/main" xmlns="" w="9525">
+                  <a14:hiddenLine xmlns="" xmlns:a14="http://schemas.microsoft.com/office/drawing/2010/main" w="9525">
                     <a:solidFill>
                       <a:srgbClr val="000000"/>
                     </a:solidFill>
@@ -10535,7 +11324,7 @@
               </a:ln>
               <a:extLst>
                 <a:ext uri="{91240B29-F687-4f45-9708-019B960494DF}">
-                  <a14:hiddenLine xmlns:a14="http://schemas.microsoft.com/office/drawing/2010/main" xmlns="" w="9525">
+                  <a14:hiddenLine xmlns="" xmlns:a14="http://schemas.microsoft.com/office/drawing/2010/main" w="9525">
                     <a:solidFill>
                       <a:srgbClr val="000000"/>
                     </a:solidFill>
@@ -10597,7 +11386,7 @@
               </a:ln>
               <a:extLst>
                 <a:ext uri="{91240B29-F687-4f45-9708-019B960494DF}">
-                  <a14:hiddenLine xmlns:a14="http://schemas.microsoft.com/office/drawing/2010/main" xmlns="" w="9525">
+                  <a14:hiddenLine xmlns="" xmlns:a14="http://schemas.microsoft.com/office/drawing/2010/main" w="9525">
                     <a:solidFill>
                       <a:srgbClr val="000000"/>
                     </a:solidFill>
@@ -10687,7 +11476,7 @@
               </a:ln>
               <a:extLst>
                 <a:ext uri="{91240B29-F687-4f45-9708-019B960494DF}">
-                  <a14:hiddenLine xmlns:a14="http://schemas.microsoft.com/office/drawing/2010/main" xmlns="" w="9525">
+                  <a14:hiddenLine xmlns="" xmlns:a14="http://schemas.microsoft.com/office/drawing/2010/main" w="9525">
                     <a:solidFill>
                       <a:srgbClr val="000000"/>
                     </a:solidFill>
@@ -10721,7 +11510,7 @@
               </a:ln>
               <a:extLst>
                 <a:ext uri="{91240B29-F687-4f45-9708-019B960494DF}">
-                  <a14:hiddenLine xmlns:a14="http://schemas.microsoft.com/office/drawing/2010/main" xmlns="" w="9525">
+                  <a14:hiddenLine xmlns="" xmlns:a14="http://schemas.microsoft.com/office/drawing/2010/main" w="9525">
                     <a:solidFill>
                       <a:srgbClr val="000000"/>
                     </a:solidFill>
@@ -10786,7 +11575,7 @@
               </a:ln>
               <a:extLst>
                 <a:ext uri="{91240B29-F687-4f45-9708-019B960494DF}">
-                  <a14:hiddenLine xmlns:a14="http://schemas.microsoft.com/office/drawing/2010/main" xmlns="" w="9525">
+                  <a14:hiddenLine xmlns="" xmlns:a14="http://schemas.microsoft.com/office/drawing/2010/main" w="9525">
                     <a:solidFill>
                       <a:srgbClr val="000000"/>
                     </a:solidFill>
@@ -10876,7 +11665,7 @@
               </a:ln>
               <a:extLst>
                 <a:ext uri="{91240B29-F687-4f45-9708-019B960494DF}">
-                  <a14:hiddenLine xmlns:a14="http://schemas.microsoft.com/office/drawing/2010/main" xmlns="" w="9525">
+                  <a14:hiddenLine xmlns="" xmlns:a14="http://schemas.microsoft.com/office/drawing/2010/main" w="9525">
                     <a:solidFill>
                       <a:srgbClr val="000000"/>
                     </a:solidFill>
@@ -10938,7 +11727,7 @@
               </a:ln>
               <a:extLst>
                 <a:ext uri="{91240B29-F687-4f45-9708-019B960494DF}">
-                  <a14:hiddenLine xmlns:a14="http://schemas.microsoft.com/office/drawing/2010/main" xmlns="" w="9525">
+                  <a14:hiddenLine xmlns="" xmlns:a14="http://schemas.microsoft.com/office/drawing/2010/main" w="9525">
                     <a:solidFill>
                       <a:srgbClr val="000000"/>
                     </a:solidFill>
@@ -11028,7 +11817,7 @@
               </a:ln>
               <a:extLst>
                 <a:ext uri="{91240B29-F687-4f45-9708-019B960494DF}">
-                  <a14:hiddenLine xmlns:a14="http://schemas.microsoft.com/office/drawing/2010/main" xmlns="" w="9525">
+                  <a14:hiddenLine xmlns="" xmlns:a14="http://schemas.microsoft.com/office/drawing/2010/main" w="9525">
                     <a:solidFill>
                       <a:srgbClr val="000000"/>
                     </a:solidFill>
@@ -11093,7 +11882,7 @@
               </a:ln>
               <a:extLst>
                 <a:ext uri="{91240B29-F687-4f45-9708-019B960494DF}">
-                  <a14:hiddenLine xmlns:a14="http://schemas.microsoft.com/office/drawing/2010/main" xmlns="" w="9525">
+                  <a14:hiddenLine xmlns="" xmlns:a14="http://schemas.microsoft.com/office/drawing/2010/main" w="9525">
                     <a:solidFill>
                       <a:srgbClr val="000000"/>
                     </a:solidFill>
@@ -11155,7 +11944,7 @@
               </a:ln>
               <a:extLst>
                 <a:ext uri="{91240B29-F687-4f45-9708-019B960494DF}">
-                  <a14:hiddenLine xmlns:a14="http://schemas.microsoft.com/office/drawing/2010/main" xmlns="" w="9525">
+                  <a14:hiddenLine xmlns="" xmlns:a14="http://schemas.microsoft.com/office/drawing/2010/main" w="9525">
                     <a:solidFill>
                       <a:srgbClr val="000000"/>
                     </a:solidFill>
@@ -11245,7 +12034,7 @@
               </a:ln>
               <a:extLst>
                 <a:ext uri="{91240B29-F687-4f45-9708-019B960494DF}">
-                  <a14:hiddenLine xmlns:a14="http://schemas.microsoft.com/office/drawing/2010/main" xmlns="" w="9525">
+                  <a14:hiddenLine xmlns="" xmlns:a14="http://schemas.microsoft.com/office/drawing/2010/main" w="9525">
                     <a:solidFill>
                       <a:srgbClr val="000000"/>
                     </a:solidFill>
@@ -11335,7 +12124,7 @@
               </a:ln>
               <a:extLst>
                 <a:ext uri="{91240B29-F687-4f45-9708-019B960494DF}">
-                  <a14:hiddenLine xmlns:a14="http://schemas.microsoft.com/office/drawing/2010/main" xmlns="" w="9525">
+                  <a14:hiddenLine xmlns="" xmlns:a14="http://schemas.microsoft.com/office/drawing/2010/main" w="9525">
                     <a:solidFill>
                       <a:srgbClr val="000000"/>
                     </a:solidFill>
@@ -11400,7 +12189,7 @@
               </a:ln>
               <a:extLst>
                 <a:ext uri="{91240B29-F687-4f45-9708-019B960494DF}">
-                  <a14:hiddenLine xmlns:a14="http://schemas.microsoft.com/office/drawing/2010/main" xmlns="" w="9525">
+                  <a14:hiddenLine xmlns="" xmlns:a14="http://schemas.microsoft.com/office/drawing/2010/main" w="9525">
                     <a:solidFill>
                       <a:srgbClr val="000000"/>
                     </a:solidFill>
@@ -11520,7 +12309,7 @@
               </a:ln>
               <a:extLst>
                 <a:ext uri="{91240B29-F687-4f45-9708-019B960494DF}">
-                  <a14:hiddenLine xmlns:a14="http://schemas.microsoft.com/office/drawing/2010/main" xmlns="" w="9525">
+                  <a14:hiddenLine xmlns="" xmlns:a14="http://schemas.microsoft.com/office/drawing/2010/main" w="9525">
                     <a:solidFill>
                       <a:srgbClr val="000000"/>
                     </a:solidFill>
@@ -11618,7 +12407,7 @@
               </a:ln>
               <a:extLst>
                 <a:ext uri="{91240B29-F687-4f45-9708-019B960494DF}">
-                  <a14:hiddenLine xmlns:a14="http://schemas.microsoft.com/office/drawing/2010/main" xmlns="" w="9525">
+                  <a14:hiddenLine xmlns="" xmlns:a14="http://schemas.microsoft.com/office/drawing/2010/main" w="9525">
                     <a:solidFill>
                       <a:srgbClr val="000000"/>
                     </a:solidFill>
@@ -11733,7 +12522,7 @@
               </a:ln>
               <a:extLst>
                 <a:ext uri="{91240B29-F687-4f45-9708-019B960494DF}">
-                  <a14:hiddenLine xmlns:a14="http://schemas.microsoft.com/office/drawing/2010/main" xmlns="" w="9525">
+                  <a14:hiddenLine xmlns="" xmlns:a14="http://schemas.microsoft.com/office/drawing/2010/main" w="9525">
                     <a:solidFill>
                       <a:srgbClr val="000000"/>
                     </a:solidFill>
@@ -11823,7 +12612,7 @@
               </a:ln>
               <a:extLst>
                 <a:ext uri="{91240B29-F687-4f45-9708-019B960494DF}">
-                  <a14:hiddenLine xmlns:a14="http://schemas.microsoft.com/office/drawing/2010/main" xmlns="" w="9525">
+                  <a14:hiddenLine xmlns="" xmlns:a14="http://schemas.microsoft.com/office/drawing/2010/main" w="9525">
                     <a:solidFill>
                       <a:srgbClr val="000000"/>
                     </a:solidFill>
@@ -11888,7 +12677,7 @@
               </a:ln>
               <a:extLst>
                 <a:ext uri="{91240B29-F687-4f45-9708-019B960494DF}">
-                  <a14:hiddenLine xmlns:a14="http://schemas.microsoft.com/office/drawing/2010/main" xmlns="" w="9525">
+                  <a14:hiddenLine xmlns="" xmlns:a14="http://schemas.microsoft.com/office/drawing/2010/main" w="9525">
                     <a:solidFill>
                       <a:srgbClr val="000000"/>
                     </a:solidFill>
@@ -11978,7 +12767,7 @@
               </a:ln>
               <a:extLst>
                 <a:ext uri="{91240B29-F687-4f45-9708-019B960494DF}">
-                  <a14:hiddenLine xmlns:a14="http://schemas.microsoft.com/office/drawing/2010/main" xmlns="" w="9525">
+                  <a14:hiddenLine xmlns="" xmlns:a14="http://schemas.microsoft.com/office/drawing/2010/main" w="9525">
                     <a:solidFill>
                       <a:srgbClr val="000000"/>
                     </a:solidFill>
@@ -12046,7 +12835,7 @@
               </a:ln>
               <a:extLst>
                 <a:ext uri="{91240B29-F687-4f45-9708-019B960494DF}">
-                  <a14:hiddenLine xmlns:a14="http://schemas.microsoft.com/office/drawing/2010/main" xmlns="" w="9525">
+                  <a14:hiddenLine xmlns="" xmlns:a14="http://schemas.microsoft.com/office/drawing/2010/main" w="9525">
                     <a:solidFill>
                       <a:srgbClr val="000000"/>
                     </a:solidFill>
@@ -12136,7 +12925,7 @@
               </a:ln>
               <a:extLst>
                 <a:ext uri="{91240B29-F687-4f45-9708-019B960494DF}">
-                  <a14:hiddenLine xmlns:a14="http://schemas.microsoft.com/office/drawing/2010/main" xmlns="" w="9525">
+                  <a14:hiddenLine xmlns="" xmlns:a14="http://schemas.microsoft.com/office/drawing/2010/main" w="9525">
                     <a:solidFill>
                       <a:srgbClr val="000000"/>
                     </a:solidFill>
@@ -12204,7 +12993,7 @@
               </a:ln>
               <a:extLst>
                 <a:ext uri="{91240B29-F687-4f45-9708-019B960494DF}">
-                  <a14:hiddenLine xmlns:a14="http://schemas.microsoft.com/office/drawing/2010/main" xmlns="" w="9525">
+                  <a14:hiddenLine xmlns="" xmlns:a14="http://schemas.microsoft.com/office/drawing/2010/main" w="9525">
                     <a:solidFill>
                       <a:srgbClr val="000000"/>
                     </a:solidFill>
@@ -12294,7 +13083,7 @@
               </a:ln>
               <a:extLst>
                 <a:ext uri="{91240B29-F687-4f45-9708-019B960494DF}">
-                  <a14:hiddenLine xmlns:a14="http://schemas.microsoft.com/office/drawing/2010/main" xmlns="" w="9525">
+                  <a14:hiddenLine xmlns="" xmlns:a14="http://schemas.microsoft.com/office/drawing/2010/main" w="9525">
                     <a:solidFill>
                       <a:srgbClr val="000000"/>
                     </a:solidFill>
@@ -12328,7 +13117,7 @@
               </a:ln>
               <a:extLst>
                 <a:ext uri="{91240B29-F687-4f45-9708-019B960494DF}">
-                  <a14:hiddenLine xmlns:a14="http://schemas.microsoft.com/office/drawing/2010/main" xmlns="" w="9525">
+                  <a14:hiddenLine xmlns="" xmlns:a14="http://schemas.microsoft.com/office/drawing/2010/main" w="9525">
                     <a:solidFill>
                       <a:srgbClr val="000000"/>
                     </a:solidFill>
@@ -13844,7 +14633,7 @@
             <a:avLst/>
           </a:prstGeom>
           <a:blipFill dpi="0" rotWithShape="1">
-            <a:blip r:embed="rId2">
+            <a:blip r:embed="rId3">
               <a:alphaModFix amt="26000"/>
             </a:blip>
             <a:srcRect/>
@@ -13929,8 +14718,8 @@
         </p:nvSpPr>
         <p:spPr>
           <a:xfrm>
-            <a:off x="1817275" y="2275995"/>
-            <a:ext cx="8731455" cy="3541714"/>
+            <a:off x="1871063" y="1971194"/>
+            <a:ext cx="8731455" cy="4375817"/>
           </a:xfrm>
         </p:spPr>
         <p:txBody>
@@ -13963,6 +14752,27 @@
             <a:r>
               <a:rPr lang="en-US" sz="4000" dirty="0"/>
               <a:t>	‘Scissors, Paper, Rock’ simulator</a:t>
+            </a:r>
+          </a:p>
+          <a:p>
+            <a:pPr marL="0" indent="0">
+              <a:buNone/>
+            </a:pPr>
+            <a:r>
+              <a:rPr lang="en-US" sz="4000" dirty="0"/>
+              <a:t>	</a:t>
+            </a:r>
+            <a:r>
+              <a:rPr lang="en-US" sz="4800" b="1" i="1" dirty="0"/>
+              <a:t>‘</a:t>
+            </a:r>
+            <a:r>
+              <a:rPr lang="en-US" sz="4800" b="1" i="1" dirty="0" err="1"/>
+              <a:t>Sith</a:t>
+            </a:r>
+            <a:r>
+              <a:rPr lang="en-US" sz="4800" b="1" i="1" dirty="0"/>
+              <a:t>-Lord, Jedi, Ewok’</a:t>
             </a:r>
           </a:p>
           <a:p>
@@ -13996,7 +14806,7 @@
         </p:nvSpPr>
         <p:spPr>
           <a:xfrm>
-            <a:off x="2385392" y="3498578"/>
+            <a:off x="2377208" y="3183252"/>
             <a:ext cx="304800" cy="238539"/>
           </a:xfrm>
           <a:prstGeom prst="chevron">
@@ -14046,7 +14856,7 @@
         </p:nvSpPr>
         <p:spPr>
           <a:xfrm>
-            <a:off x="2385392" y="5088843"/>
+            <a:off x="2377208" y="5698443"/>
             <a:ext cx="304800" cy="238539"/>
           </a:xfrm>
           <a:prstGeom prst="chevron">
@@ -14388,21 +15198,30 @@
                             </p:childTnLst>
                           </p:cTn>
                         </p:par>
+                      </p:childTnLst>
+                    </p:cTn>
+                  </p:par>
+                  <p:par>
+                    <p:cTn id="25" fill="hold">
+                      <p:stCondLst>
+                        <p:cond delay="indefinite"/>
+                      </p:stCondLst>
+                      <p:childTnLst>
                         <p:par>
-                          <p:cTn id="25" fill="hold">
+                          <p:cTn id="26" fill="hold">
                             <p:stCondLst>
-                              <p:cond delay="900"/>
+                              <p:cond delay="0"/>
                             </p:stCondLst>
                             <p:childTnLst>
                               <p:par>
-                                <p:cTn id="26" presetID="22" presetClass="entr" presetSubtype="8" fill="hold" grpId="0" nodeType="afterEffect">
+                                <p:cTn id="27" presetID="22" presetClass="entr" presetSubtype="8" fill="hold" grpId="0" nodeType="clickEffect">
                                   <p:stCondLst>
                                     <p:cond delay="0"/>
                                   </p:stCondLst>
                                   <p:childTnLst>
                                     <p:set>
                                       <p:cBhvr>
-                                        <p:cTn id="27" dur="1" fill="hold">
+                                        <p:cTn id="28" dur="1" fill="hold">
                                           <p:stCondLst>
                                             <p:cond delay="0"/>
                                           </p:stCondLst>
@@ -14424,7 +15243,7 @@
                                     </p:set>
                                     <p:animEffect transition="in" filter="wipe(left)">
                                       <p:cBhvr>
-                                        <p:cTn id="28" dur="300"/>
+                                        <p:cTn id="29" dur="300"/>
                                         <p:tgtEl>
                                           <p:spTgt spid="3">
                                             <p:txEl>
@@ -14437,15 +15256,76 @@
                                   </p:childTnLst>
                                 </p:cTn>
                               </p:par>
+                            </p:childTnLst>
+                          </p:cTn>
+                        </p:par>
+                      </p:childTnLst>
+                    </p:cTn>
+                  </p:par>
+                  <p:par>
+                    <p:cTn id="30" fill="hold">
+                      <p:stCondLst>
+                        <p:cond delay="indefinite"/>
+                      </p:stCondLst>
+                      <p:childTnLst>
+                        <p:par>
+                          <p:cTn id="31" fill="hold">
+                            <p:stCondLst>
+                              <p:cond delay="0"/>
+                            </p:stCondLst>
+                            <p:childTnLst>
                               <p:par>
-                                <p:cTn id="29" presetID="2" presetClass="entr" presetSubtype="8" fill="hold" grpId="0" nodeType="withEffect">
+                                <p:cTn id="32" presetID="22" presetClass="entr" presetSubtype="8" fill="hold" grpId="0" nodeType="clickEffect">
                                   <p:stCondLst>
                                     <p:cond delay="0"/>
                                   </p:stCondLst>
                                   <p:childTnLst>
                                     <p:set>
                                       <p:cBhvr>
-                                        <p:cTn id="30" dur="1" fill="hold">
+                                        <p:cTn id="33" dur="1" fill="hold">
+                                          <p:stCondLst>
+                                            <p:cond delay="0"/>
+                                          </p:stCondLst>
+                                        </p:cTn>
+                                        <p:tgtEl>
+                                          <p:spTgt spid="3">
+                                            <p:txEl>
+                                              <p:pRg st="4" end="4"/>
+                                            </p:txEl>
+                                          </p:spTgt>
+                                        </p:tgtEl>
+                                        <p:attrNameLst>
+                                          <p:attrName>style.visibility</p:attrName>
+                                        </p:attrNameLst>
+                                      </p:cBhvr>
+                                      <p:to>
+                                        <p:strVal val="visible"/>
+                                      </p:to>
+                                    </p:set>
+                                    <p:animEffect transition="in" filter="wipe(left)">
+                                      <p:cBhvr>
+                                        <p:cTn id="34" dur="300"/>
+                                        <p:tgtEl>
+                                          <p:spTgt spid="3">
+                                            <p:txEl>
+                                              <p:pRg st="4" end="4"/>
+                                            </p:txEl>
+                                          </p:spTgt>
+                                        </p:tgtEl>
+                                      </p:cBhvr>
+                                    </p:animEffect>
+                                  </p:childTnLst>
+                                </p:cTn>
+                              </p:par>
+                              <p:par>
+                                <p:cTn id="35" presetID="2" presetClass="entr" presetSubtype="8" fill="hold" grpId="0" nodeType="withEffect">
+                                  <p:stCondLst>
+                                    <p:cond delay="0"/>
+                                  </p:stCondLst>
+                                  <p:childTnLst>
+                                    <p:set>
+                                      <p:cBhvr>
+                                        <p:cTn id="36" dur="1" fill="hold">
                                           <p:stCondLst>
                                             <p:cond delay="0"/>
                                           </p:stCondLst>
@@ -14463,7 +15343,7 @@
                                     </p:set>
                                     <p:anim calcmode="lin" valueType="num">
                                       <p:cBhvr additive="base">
-                                        <p:cTn id="31" dur="200" fill="hold"/>
+                                        <p:cTn id="37" dur="200" fill="hold"/>
                                         <p:tgtEl>
                                           <p:spTgt spid="6"/>
                                         </p:tgtEl>
@@ -14486,7 +15366,7 @@
                                     </p:anim>
                                     <p:anim calcmode="lin" valueType="num">
                                       <p:cBhvr additive="base">
-                                        <p:cTn id="32" dur="200" fill="hold"/>
+                                        <p:cTn id="38" dur="200" fill="hold"/>
                                         <p:tgtEl>
                                           <p:spTgt spid="6"/>
                                         </p:tgtEl>
@@ -14514,20 +15394,20 @@
                           </p:cTn>
                         </p:par>
                         <p:par>
-                          <p:cTn id="33" fill="hold">
+                          <p:cTn id="39" fill="hold">
                             <p:stCondLst>
-                              <p:cond delay="1200"/>
+                              <p:cond delay="300"/>
                             </p:stCondLst>
                             <p:childTnLst>
                               <p:par>
-                                <p:cTn id="34" presetID="10" presetClass="entr" presetSubtype="0" fill="hold" grpId="0" nodeType="afterEffect">
+                                <p:cTn id="40" presetID="10" presetClass="entr" presetSubtype="0" fill="hold" grpId="0" nodeType="afterEffect">
                                   <p:stCondLst>
                                     <p:cond delay="0"/>
                                   </p:stCondLst>
                                   <p:childTnLst>
                                     <p:set>
                                       <p:cBhvr>
-                                        <p:cTn id="35" dur="1" fill="hold">
+                                        <p:cTn id="41" dur="1" fill="hold">
                                           <p:stCondLst>
                                             <p:cond delay="0"/>
                                           </p:stCondLst>
@@ -14545,7 +15425,7 @@
                                     </p:set>
                                     <p:animEffect transition="in" filter="fade">
                                       <p:cBhvr>
-                                        <p:cTn id="36" dur="5000"/>
+                                        <p:cTn id="42" dur="5000"/>
                                         <p:tgtEl>
                                           <p:spTgt spid="4"/>
                                         </p:tgtEl>
@@ -18120,6 +19000,1502 @@
 </p:sld>
 </file>
 
+<file path=ppt/slides/slide6.xml><?xml version="1.0" encoding="utf-8"?>
+<p:sld xmlns:a="http://schemas.openxmlformats.org/drawingml/2006/main" xmlns:r="http://schemas.openxmlformats.org/officeDocument/2006/relationships" xmlns:p="http://schemas.openxmlformats.org/presentationml/2006/main">
+  <p:cSld>
+    <p:spTree>
+      <p:nvGrpSpPr>
+        <p:cNvPr id="1" name=""/>
+        <p:cNvGrpSpPr/>
+        <p:nvPr/>
+      </p:nvGrpSpPr>
+      <p:grpSpPr>
+        <a:xfrm>
+          <a:off x="0" y="0"/>
+          <a:ext cx="0" cy="0"/>
+          <a:chOff x="0" y="0"/>
+          <a:chExt cx="0" cy="0"/>
+        </a:xfrm>
+      </p:grpSpPr>
+      <p:sp>
+        <p:nvSpPr>
+          <p:cNvPr id="9" name="Content Placeholder 2">
+            <a:extLst>
+              <a:ext uri="{FF2B5EF4-FFF2-40B4-BE49-F238E27FC236}">
+                <a16:creationId xmlns:a16="http://schemas.microsoft.com/office/drawing/2014/main" id="{6CC2177F-A58C-CF42-B8F8-208784099F91}"/>
+              </a:ext>
+            </a:extLst>
+          </p:cNvPr>
+          <p:cNvSpPr txBox="1">
+            <a:spLocks/>
+          </p:cNvSpPr>
+          <p:nvPr/>
+        </p:nvSpPr>
+        <p:spPr>
+          <a:xfrm>
+            <a:off x="5854291" y="2012423"/>
+            <a:ext cx="5453046" cy="4252912"/>
+          </a:xfrm>
+          <a:prstGeom prst="rect">
+            <a:avLst/>
+          </a:prstGeom>
+        </p:spPr>
+        <p:txBody>
+          <a:bodyPr vert="horz" lIns="91440" tIns="45720" rIns="91440" bIns="45720" rtlCol="0">
+            <a:normAutofit/>
+          </a:bodyPr>
+          <a:lstStyle>
+            <a:lvl1pPr marL="228600" indent="-228600" algn="l" defTabSz="914400" rtl="0" eaLnBrk="1" latinLnBrk="0" hangingPunct="1">
+              <a:lnSpc>
+                <a:spcPct val="120000"/>
+              </a:lnSpc>
+              <a:spcBef>
+                <a:spcPts val="1000"/>
+              </a:spcBef>
+              <a:buSzPct val="125000"/>
+              <a:buFont typeface="Arial" panose="020B0604020202020204" pitchFamily="34" charset="0"/>
+              <a:buChar char="•"/>
+              <a:defRPr sz="2400" kern="1200">
+                <a:solidFill>
+                  <a:schemeClr val="tx1"/>
+                </a:solidFill>
+                <a:effectLst>
+                  <a:outerShdw blurRad="152400" dist="38100" dir="2700000" algn="tl">
+                    <a:srgbClr val="000000">
+                      <a:alpha val="36000"/>
+                    </a:srgbClr>
+                  </a:outerShdw>
+                </a:effectLst>
+                <a:latin typeface="+mn-lt"/>
+                <a:ea typeface="+mn-ea"/>
+                <a:cs typeface="+mn-cs"/>
+              </a:defRPr>
+            </a:lvl1pPr>
+            <a:lvl2pPr marL="685800" indent="-228600" algn="l" defTabSz="914400" rtl="0" eaLnBrk="1" latinLnBrk="0" hangingPunct="1">
+              <a:lnSpc>
+                <a:spcPct val="120000"/>
+              </a:lnSpc>
+              <a:spcBef>
+                <a:spcPts val="500"/>
+              </a:spcBef>
+              <a:buSzPct val="125000"/>
+              <a:buFont typeface="Arial" panose="020B0604020202020204" pitchFamily="34" charset="0"/>
+              <a:buChar char="•"/>
+              <a:defRPr sz="2000" kern="1200">
+                <a:solidFill>
+                  <a:schemeClr val="tx1"/>
+                </a:solidFill>
+                <a:effectLst>
+                  <a:outerShdw blurRad="152400" dist="38100" dir="2700000" algn="tl">
+                    <a:srgbClr val="000000">
+                      <a:alpha val="36000"/>
+                    </a:srgbClr>
+                  </a:outerShdw>
+                </a:effectLst>
+                <a:latin typeface="+mn-lt"/>
+                <a:ea typeface="+mn-ea"/>
+                <a:cs typeface="+mn-cs"/>
+              </a:defRPr>
+            </a:lvl2pPr>
+            <a:lvl3pPr marL="1143000" indent="-228600" algn="l" defTabSz="914400" rtl="0" eaLnBrk="1" latinLnBrk="0" hangingPunct="1">
+              <a:lnSpc>
+                <a:spcPct val="120000"/>
+              </a:lnSpc>
+              <a:spcBef>
+                <a:spcPts val="500"/>
+              </a:spcBef>
+              <a:buSzPct val="125000"/>
+              <a:buFont typeface="Arial" panose="020B0604020202020204" pitchFamily="34" charset="0"/>
+              <a:buChar char="•"/>
+              <a:defRPr sz="1800" kern="1200">
+                <a:solidFill>
+                  <a:schemeClr val="tx1"/>
+                </a:solidFill>
+                <a:effectLst>
+                  <a:outerShdw blurRad="152400" dist="38100" dir="2700000" algn="tl">
+                    <a:srgbClr val="000000">
+                      <a:alpha val="36000"/>
+                    </a:srgbClr>
+                  </a:outerShdw>
+                </a:effectLst>
+                <a:latin typeface="+mn-lt"/>
+                <a:ea typeface="+mn-ea"/>
+                <a:cs typeface="+mn-cs"/>
+              </a:defRPr>
+            </a:lvl3pPr>
+            <a:lvl4pPr marL="1600200" indent="-228600" algn="l" defTabSz="914400" rtl="0" eaLnBrk="1" latinLnBrk="0" hangingPunct="1">
+              <a:lnSpc>
+                <a:spcPct val="120000"/>
+              </a:lnSpc>
+              <a:spcBef>
+                <a:spcPts val="500"/>
+              </a:spcBef>
+              <a:buSzPct val="125000"/>
+              <a:buFont typeface="Arial" panose="020B0604020202020204" pitchFamily="34" charset="0"/>
+              <a:buChar char="•"/>
+              <a:defRPr sz="1600" kern="1200">
+                <a:solidFill>
+                  <a:schemeClr val="tx1"/>
+                </a:solidFill>
+                <a:effectLst>
+                  <a:outerShdw blurRad="152400" dist="38100" dir="2700000" algn="tl">
+                    <a:srgbClr val="000000">
+                      <a:alpha val="36000"/>
+                    </a:srgbClr>
+                  </a:outerShdw>
+                </a:effectLst>
+                <a:latin typeface="+mn-lt"/>
+                <a:ea typeface="+mn-ea"/>
+                <a:cs typeface="+mn-cs"/>
+              </a:defRPr>
+            </a:lvl4pPr>
+            <a:lvl5pPr marL="2057400" indent="-228600" algn="l" defTabSz="914400" rtl="0" eaLnBrk="1" latinLnBrk="0" hangingPunct="1">
+              <a:lnSpc>
+                <a:spcPct val="120000"/>
+              </a:lnSpc>
+              <a:spcBef>
+                <a:spcPts val="500"/>
+              </a:spcBef>
+              <a:buSzPct val="125000"/>
+              <a:buFont typeface="Arial" panose="020B0604020202020204" pitchFamily="34" charset="0"/>
+              <a:buChar char="•"/>
+              <a:defRPr sz="1600" kern="1200">
+                <a:solidFill>
+                  <a:schemeClr val="tx1"/>
+                </a:solidFill>
+                <a:effectLst>
+                  <a:outerShdw blurRad="152400" dist="38100" dir="2700000" algn="tl">
+                    <a:srgbClr val="000000">
+                      <a:alpha val="36000"/>
+                    </a:srgbClr>
+                  </a:outerShdw>
+                </a:effectLst>
+                <a:latin typeface="+mn-lt"/>
+                <a:ea typeface="+mn-ea"/>
+                <a:cs typeface="+mn-cs"/>
+              </a:defRPr>
+            </a:lvl5pPr>
+            <a:lvl6pPr marL="2514600" indent="-228600" algn="l" defTabSz="914400" rtl="0" eaLnBrk="1" latinLnBrk="0" hangingPunct="1">
+              <a:lnSpc>
+                <a:spcPct val="120000"/>
+              </a:lnSpc>
+              <a:spcBef>
+                <a:spcPts val="500"/>
+              </a:spcBef>
+              <a:buSzPct val="125000"/>
+              <a:buFont typeface="Arial" panose="020B0604020202020204" pitchFamily="34" charset="0"/>
+              <a:buChar char="•"/>
+              <a:defRPr sz="1400" kern="1200">
+                <a:solidFill>
+                  <a:schemeClr val="tx1"/>
+                </a:solidFill>
+                <a:latin typeface="+mn-lt"/>
+                <a:ea typeface="+mn-ea"/>
+                <a:cs typeface="+mn-cs"/>
+              </a:defRPr>
+            </a:lvl6pPr>
+            <a:lvl7pPr marL="2971800" indent="-228600" algn="l" defTabSz="914400" rtl="0" eaLnBrk="1" latinLnBrk="0" hangingPunct="1">
+              <a:lnSpc>
+                <a:spcPct val="120000"/>
+              </a:lnSpc>
+              <a:spcBef>
+                <a:spcPts val="500"/>
+              </a:spcBef>
+              <a:buSzPct val="125000"/>
+              <a:buFont typeface="Arial" panose="020B0604020202020204" pitchFamily="34" charset="0"/>
+              <a:buChar char="•"/>
+              <a:defRPr sz="1400" kern="1200">
+                <a:solidFill>
+                  <a:schemeClr val="tx1"/>
+                </a:solidFill>
+                <a:latin typeface="+mn-lt"/>
+                <a:ea typeface="+mn-ea"/>
+                <a:cs typeface="+mn-cs"/>
+              </a:defRPr>
+            </a:lvl7pPr>
+            <a:lvl8pPr marL="3429000" indent="-228600" algn="l" defTabSz="914400" rtl="0" eaLnBrk="1" latinLnBrk="0" hangingPunct="1">
+              <a:lnSpc>
+                <a:spcPct val="120000"/>
+              </a:lnSpc>
+              <a:spcBef>
+                <a:spcPts val="500"/>
+              </a:spcBef>
+              <a:buSzPct val="125000"/>
+              <a:buFont typeface="Arial" panose="020B0604020202020204" pitchFamily="34" charset="0"/>
+              <a:buChar char="•"/>
+              <a:defRPr sz="1400" kern="1200">
+                <a:solidFill>
+                  <a:schemeClr val="tx1"/>
+                </a:solidFill>
+                <a:latin typeface="+mn-lt"/>
+                <a:ea typeface="+mn-ea"/>
+                <a:cs typeface="+mn-cs"/>
+              </a:defRPr>
+            </a:lvl8pPr>
+            <a:lvl9pPr marL="3886200" indent="-228600" algn="l" defTabSz="914400" rtl="0" eaLnBrk="1" latinLnBrk="0" hangingPunct="1">
+              <a:lnSpc>
+                <a:spcPct val="120000"/>
+              </a:lnSpc>
+              <a:spcBef>
+                <a:spcPts val="500"/>
+              </a:spcBef>
+              <a:buSzPct val="125000"/>
+              <a:buFont typeface="Arial" panose="020B0604020202020204" pitchFamily="34" charset="0"/>
+              <a:buChar char="•"/>
+              <a:defRPr sz="1400" kern="1200">
+                <a:solidFill>
+                  <a:schemeClr val="tx1"/>
+                </a:solidFill>
+                <a:latin typeface="+mn-lt"/>
+                <a:ea typeface="+mn-ea"/>
+                <a:cs typeface="+mn-cs"/>
+              </a:defRPr>
+            </a:lvl9pPr>
+          </a:lstStyle>
+          <a:p>
+            <a:pPr marL="0" indent="0">
+              <a:buFont typeface="Arial" panose="020B0604020202020204" pitchFamily="34" charset="0"/>
+              <a:buNone/>
+            </a:pPr>
+            <a:endParaRPr lang="en-US" sz="4800" dirty="0"/>
+          </a:p>
+          <a:p>
+            <a:pPr marL="0" indent="0">
+              <a:buFont typeface="Arial" panose="020B0604020202020204" pitchFamily="34" charset="0"/>
+              <a:buNone/>
+            </a:pPr>
+            <a:r>
+              <a:rPr lang="en-US" sz="4000" dirty="0"/>
+              <a:t>	Require Loop Errors</a:t>
+            </a:r>
+          </a:p>
+          <a:p>
+            <a:pPr marL="0" indent="0">
+              <a:buNone/>
+            </a:pPr>
+            <a:r>
+              <a:rPr lang="en-US" sz="4000" dirty="0"/>
+              <a:t>	Scope Creep</a:t>
+            </a:r>
+          </a:p>
+        </p:txBody>
+      </p:sp>
+      <p:sp>
+        <p:nvSpPr>
+          <p:cNvPr id="2" name="Title 1">
+            <a:extLst>
+              <a:ext uri="{FF2B5EF4-FFF2-40B4-BE49-F238E27FC236}">
+                <a16:creationId xmlns:a16="http://schemas.microsoft.com/office/drawing/2014/main" id="{E871C266-3213-DC46-9244-B1D0B4A0AF23}"/>
+              </a:ext>
+            </a:extLst>
+          </p:cNvPr>
+          <p:cNvSpPr>
+            <a:spLocks noGrp="1"/>
+          </p:cNvSpPr>
+          <p:nvPr>
+            <p:ph type="title"/>
+          </p:nvPr>
+        </p:nvSpPr>
+        <p:spPr/>
+        <p:txBody>
+          <a:bodyPr>
+            <a:normAutofit/>
+          </a:bodyPr>
+          <a:lstStyle/>
+          <a:p>
+            <a:r>
+              <a:rPr lang="en-US" sz="6600" dirty="0"/>
+              <a:t>Review</a:t>
+            </a:r>
+          </a:p>
+        </p:txBody>
+      </p:sp>
+      <p:sp>
+        <p:nvSpPr>
+          <p:cNvPr id="3" name="Content Placeholder 2">
+            <a:extLst>
+              <a:ext uri="{FF2B5EF4-FFF2-40B4-BE49-F238E27FC236}">
+                <a16:creationId xmlns:a16="http://schemas.microsoft.com/office/drawing/2014/main" id="{2EF632BB-9F59-0E4B-A430-4D90F4DB5991}"/>
+              </a:ext>
+            </a:extLst>
+          </p:cNvPr>
+          <p:cNvSpPr>
+            <a:spLocks noGrp="1"/>
+          </p:cNvSpPr>
+          <p:nvPr>
+            <p:ph idx="1"/>
+          </p:nvPr>
+        </p:nvSpPr>
+        <p:spPr>
+          <a:xfrm>
+            <a:off x="1620057" y="2012423"/>
+            <a:ext cx="4956058" cy="4252912"/>
+          </a:xfrm>
+        </p:spPr>
+        <p:txBody>
+          <a:bodyPr>
+            <a:normAutofit/>
+          </a:bodyPr>
+          <a:lstStyle/>
+          <a:p>
+            <a:pPr marL="0" indent="0">
+              <a:buNone/>
+            </a:pPr>
+            <a:r>
+              <a:rPr lang="en-US" sz="4800" b="1" dirty="0"/>
+              <a:t>Challenges:</a:t>
+            </a:r>
+          </a:p>
+          <a:p>
+            <a:pPr marL="0" indent="0">
+              <a:buNone/>
+            </a:pPr>
+            <a:r>
+              <a:rPr lang="en-US" sz="4000" dirty="0"/>
+              <a:t>	Lengthy Testing</a:t>
+            </a:r>
+          </a:p>
+          <a:p>
+            <a:pPr marL="0" indent="0">
+              <a:buNone/>
+            </a:pPr>
+            <a:r>
+              <a:rPr lang="en-US" sz="4000" dirty="0"/>
+              <a:t>	MVC</a:t>
+            </a:r>
+          </a:p>
+          <a:p>
+            <a:pPr marL="0" indent="0">
+              <a:buNone/>
+            </a:pPr>
+            <a:r>
+              <a:rPr lang="en-US" sz="4000" dirty="0"/>
+              <a:t>	</a:t>
+            </a:r>
+          </a:p>
+        </p:txBody>
+      </p:sp>
+      <p:sp>
+        <p:nvSpPr>
+          <p:cNvPr id="5" name="Chevron 4">
+            <a:extLst>
+              <a:ext uri="{FF2B5EF4-FFF2-40B4-BE49-F238E27FC236}">
+                <a16:creationId xmlns:a16="http://schemas.microsoft.com/office/drawing/2014/main" id="{D9D93C43-E4EA-5144-A737-68E93905315A}"/>
+              </a:ext>
+            </a:extLst>
+          </p:cNvPr>
+          <p:cNvSpPr/>
+          <p:nvPr/>
+        </p:nvSpPr>
+        <p:spPr>
+          <a:xfrm>
+            <a:off x="2176396" y="3352256"/>
+            <a:ext cx="304800" cy="238539"/>
+          </a:xfrm>
+          <a:prstGeom prst="chevron">
+            <a:avLst/>
+          </a:prstGeom>
+        </p:spPr>
+        <p:style>
+          <a:lnRef idx="2">
+            <a:schemeClr val="accent1">
+              <a:shade val="50000"/>
+            </a:schemeClr>
+          </a:lnRef>
+          <a:fillRef idx="1">
+            <a:schemeClr val="accent1"/>
+          </a:fillRef>
+          <a:effectRef idx="0">
+            <a:schemeClr val="accent1"/>
+          </a:effectRef>
+          <a:fontRef idx="minor">
+            <a:schemeClr val="lt1"/>
+          </a:fontRef>
+        </p:style>
+        <p:txBody>
+          <a:bodyPr rtlCol="0" anchor="ctr"/>
+          <a:lstStyle/>
+          <a:p>
+            <a:pPr algn="ctr"/>
+            <a:endParaRPr lang="en-US">
+              <a:solidFill>
+                <a:schemeClr val="tx1"/>
+              </a:solidFill>
+            </a:endParaRPr>
+          </a:p>
+        </p:txBody>
+      </p:sp>
+      <p:sp>
+        <p:nvSpPr>
+          <p:cNvPr id="6" name="Chevron 5">
+            <a:extLst>
+              <a:ext uri="{FF2B5EF4-FFF2-40B4-BE49-F238E27FC236}">
+                <a16:creationId xmlns:a16="http://schemas.microsoft.com/office/drawing/2014/main" id="{A1423BC2-A383-AF46-A899-6F60B9D7C396}"/>
+              </a:ext>
+            </a:extLst>
+          </p:cNvPr>
+          <p:cNvSpPr/>
+          <p:nvPr/>
+        </p:nvSpPr>
+        <p:spPr>
+          <a:xfrm>
+            <a:off x="2176396" y="4188207"/>
+            <a:ext cx="304800" cy="238539"/>
+          </a:xfrm>
+          <a:prstGeom prst="chevron">
+            <a:avLst/>
+          </a:prstGeom>
+        </p:spPr>
+        <p:style>
+          <a:lnRef idx="2">
+            <a:schemeClr val="accent1">
+              <a:shade val="50000"/>
+            </a:schemeClr>
+          </a:lnRef>
+          <a:fillRef idx="1">
+            <a:schemeClr val="accent1"/>
+          </a:fillRef>
+          <a:effectRef idx="0">
+            <a:schemeClr val="accent1"/>
+          </a:effectRef>
+          <a:fontRef idx="minor">
+            <a:schemeClr val="lt1"/>
+          </a:fontRef>
+        </p:style>
+        <p:txBody>
+          <a:bodyPr rtlCol="0" anchor="ctr"/>
+          <a:lstStyle/>
+          <a:p>
+            <a:pPr algn="ctr"/>
+            <a:endParaRPr lang="en-US">
+              <a:solidFill>
+                <a:schemeClr val="tx1"/>
+              </a:solidFill>
+            </a:endParaRPr>
+          </a:p>
+        </p:txBody>
+      </p:sp>
+      <p:sp>
+        <p:nvSpPr>
+          <p:cNvPr id="7" name="Chevron 6">
+            <a:extLst>
+              <a:ext uri="{FF2B5EF4-FFF2-40B4-BE49-F238E27FC236}">
+                <a16:creationId xmlns:a16="http://schemas.microsoft.com/office/drawing/2014/main" id="{8836E8AA-8B58-7541-BF3E-CFA9BCB9B121}"/>
+              </a:ext>
+            </a:extLst>
+          </p:cNvPr>
+          <p:cNvSpPr/>
+          <p:nvPr/>
+        </p:nvSpPr>
+        <p:spPr>
+          <a:xfrm>
+            <a:off x="6376764" y="3352256"/>
+            <a:ext cx="304800" cy="238539"/>
+          </a:xfrm>
+          <a:prstGeom prst="chevron">
+            <a:avLst/>
+          </a:prstGeom>
+        </p:spPr>
+        <p:style>
+          <a:lnRef idx="2">
+            <a:schemeClr val="accent1">
+              <a:shade val="50000"/>
+            </a:schemeClr>
+          </a:lnRef>
+          <a:fillRef idx="1">
+            <a:schemeClr val="accent1"/>
+          </a:fillRef>
+          <a:effectRef idx="0">
+            <a:schemeClr val="accent1"/>
+          </a:effectRef>
+          <a:fontRef idx="minor">
+            <a:schemeClr val="lt1"/>
+          </a:fontRef>
+        </p:style>
+        <p:txBody>
+          <a:bodyPr rtlCol="0" anchor="ctr"/>
+          <a:lstStyle/>
+          <a:p>
+            <a:pPr algn="ctr"/>
+            <a:endParaRPr lang="en-US">
+              <a:solidFill>
+                <a:schemeClr val="tx1"/>
+              </a:solidFill>
+            </a:endParaRPr>
+          </a:p>
+        </p:txBody>
+      </p:sp>
+      <p:sp>
+        <p:nvSpPr>
+          <p:cNvPr id="8" name="Chevron 7">
+            <a:extLst>
+              <a:ext uri="{FF2B5EF4-FFF2-40B4-BE49-F238E27FC236}">
+                <a16:creationId xmlns:a16="http://schemas.microsoft.com/office/drawing/2014/main" id="{F0CEA641-4B22-CD4B-B320-12C8985660FF}"/>
+              </a:ext>
+            </a:extLst>
+          </p:cNvPr>
+          <p:cNvSpPr/>
+          <p:nvPr/>
+        </p:nvSpPr>
+        <p:spPr>
+          <a:xfrm>
+            <a:off x="6383872" y="4188206"/>
+            <a:ext cx="304800" cy="238539"/>
+          </a:xfrm>
+          <a:prstGeom prst="chevron">
+            <a:avLst/>
+          </a:prstGeom>
+        </p:spPr>
+        <p:style>
+          <a:lnRef idx="2">
+            <a:schemeClr val="accent1">
+              <a:shade val="50000"/>
+            </a:schemeClr>
+          </a:lnRef>
+          <a:fillRef idx="1">
+            <a:schemeClr val="accent1"/>
+          </a:fillRef>
+          <a:effectRef idx="0">
+            <a:schemeClr val="accent1"/>
+          </a:effectRef>
+          <a:fontRef idx="minor">
+            <a:schemeClr val="lt1"/>
+          </a:fontRef>
+        </p:style>
+        <p:txBody>
+          <a:bodyPr rtlCol="0" anchor="ctr"/>
+          <a:lstStyle/>
+          <a:p>
+            <a:pPr algn="ctr"/>
+            <a:endParaRPr lang="en-US">
+              <a:solidFill>
+                <a:schemeClr val="tx1"/>
+              </a:solidFill>
+            </a:endParaRPr>
+          </a:p>
+        </p:txBody>
+      </p:sp>
+    </p:spTree>
+    <p:extLst>
+      <p:ext uri="{BB962C8B-B14F-4D97-AF65-F5344CB8AC3E}">
+        <p14:creationId xmlns:p14="http://schemas.microsoft.com/office/powerpoint/2010/main" val="913140603"/>
+      </p:ext>
+    </p:extLst>
+  </p:cSld>
+  <p:clrMapOvr>
+    <a:masterClrMapping/>
+  </p:clrMapOvr>
+  <p:timing>
+    <p:tnLst>
+      <p:par>
+        <p:cTn id="1" dur="indefinite" restart="never" nodeType="tmRoot">
+          <p:childTnLst>
+            <p:seq concurrent="1" nextAc="seek">
+              <p:cTn id="2" dur="indefinite" nodeType="mainSeq">
+                <p:childTnLst>
+                  <p:par>
+                    <p:cTn id="3" fill="hold">
+                      <p:stCondLst>
+                        <p:cond delay="indefinite"/>
+                      </p:stCondLst>
+                      <p:childTnLst>
+                        <p:par>
+                          <p:cTn id="4" fill="hold">
+                            <p:stCondLst>
+                              <p:cond delay="0"/>
+                            </p:stCondLst>
+                            <p:childTnLst>
+                              <p:par>
+                                <p:cTn id="5" presetID="9" presetClass="entr" presetSubtype="0" fill="hold" grpId="0" nodeType="clickEffect">
+                                  <p:stCondLst>
+                                    <p:cond delay="0"/>
+                                  </p:stCondLst>
+                                  <p:childTnLst>
+                                    <p:set>
+                                      <p:cBhvr>
+                                        <p:cTn id="6" dur="1" fill="hold">
+                                          <p:stCondLst>
+                                            <p:cond delay="0"/>
+                                          </p:stCondLst>
+                                        </p:cTn>
+                                        <p:tgtEl>
+                                          <p:spTgt spid="2"/>
+                                        </p:tgtEl>
+                                        <p:attrNameLst>
+                                          <p:attrName>style.visibility</p:attrName>
+                                        </p:attrNameLst>
+                                      </p:cBhvr>
+                                      <p:to>
+                                        <p:strVal val="visible"/>
+                                      </p:to>
+                                    </p:set>
+                                    <p:animEffect transition="in" filter="dissolve">
+                                      <p:cBhvr>
+                                        <p:cTn id="7" dur="300"/>
+                                        <p:tgtEl>
+                                          <p:spTgt spid="2"/>
+                                        </p:tgtEl>
+                                      </p:cBhvr>
+                                    </p:animEffect>
+                                  </p:childTnLst>
+                                </p:cTn>
+                              </p:par>
+                            </p:childTnLst>
+                          </p:cTn>
+                        </p:par>
+                      </p:childTnLst>
+                    </p:cTn>
+                  </p:par>
+                  <p:par>
+                    <p:cTn id="8" fill="hold">
+                      <p:stCondLst>
+                        <p:cond delay="indefinite"/>
+                      </p:stCondLst>
+                      <p:childTnLst>
+                        <p:par>
+                          <p:cTn id="9" fill="hold">
+                            <p:stCondLst>
+                              <p:cond delay="0"/>
+                            </p:stCondLst>
+                            <p:childTnLst>
+                              <p:par>
+                                <p:cTn id="10" presetID="22" presetClass="entr" presetSubtype="8" fill="hold" grpId="0" nodeType="clickEffect">
+                                  <p:stCondLst>
+                                    <p:cond delay="0"/>
+                                  </p:stCondLst>
+                                  <p:childTnLst>
+                                    <p:set>
+                                      <p:cBhvr>
+                                        <p:cTn id="11" dur="1" fill="hold">
+                                          <p:stCondLst>
+                                            <p:cond delay="0"/>
+                                          </p:stCondLst>
+                                        </p:cTn>
+                                        <p:tgtEl>
+                                          <p:spTgt spid="3">
+                                            <p:txEl>
+                                              <p:pRg st="0" end="0"/>
+                                            </p:txEl>
+                                          </p:spTgt>
+                                        </p:tgtEl>
+                                        <p:attrNameLst>
+                                          <p:attrName>style.visibility</p:attrName>
+                                        </p:attrNameLst>
+                                      </p:cBhvr>
+                                      <p:to>
+                                        <p:strVal val="visible"/>
+                                      </p:to>
+                                    </p:set>
+                                    <p:animEffect transition="in" filter="wipe(left)">
+                                      <p:cBhvr>
+                                        <p:cTn id="12" dur="300"/>
+                                        <p:tgtEl>
+                                          <p:spTgt spid="3">
+                                            <p:txEl>
+                                              <p:pRg st="0" end="0"/>
+                                            </p:txEl>
+                                          </p:spTgt>
+                                        </p:tgtEl>
+                                      </p:cBhvr>
+                                    </p:animEffect>
+                                  </p:childTnLst>
+                                </p:cTn>
+                              </p:par>
+                            </p:childTnLst>
+                          </p:cTn>
+                        </p:par>
+                        <p:par>
+                          <p:cTn id="13" fill="hold">
+                            <p:stCondLst>
+                              <p:cond delay="300"/>
+                            </p:stCondLst>
+                            <p:childTnLst>
+                              <p:par>
+                                <p:cTn id="14" presetID="22" presetClass="entr" presetSubtype="8" fill="hold" grpId="0" nodeType="afterEffect">
+                                  <p:stCondLst>
+                                    <p:cond delay="0"/>
+                                  </p:stCondLst>
+                                  <p:childTnLst>
+                                    <p:set>
+                                      <p:cBhvr>
+                                        <p:cTn id="15" dur="1" fill="hold">
+                                          <p:stCondLst>
+                                            <p:cond delay="0"/>
+                                          </p:stCondLst>
+                                        </p:cTn>
+                                        <p:tgtEl>
+                                          <p:spTgt spid="3">
+                                            <p:txEl>
+                                              <p:pRg st="1" end="1"/>
+                                            </p:txEl>
+                                          </p:spTgt>
+                                        </p:tgtEl>
+                                        <p:attrNameLst>
+                                          <p:attrName>style.visibility</p:attrName>
+                                        </p:attrNameLst>
+                                      </p:cBhvr>
+                                      <p:to>
+                                        <p:strVal val="visible"/>
+                                      </p:to>
+                                    </p:set>
+                                    <p:animEffect transition="in" filter="wipe(left)">
+                                      <p:cBhvr>
+                                        <p:cTn id="16" dur="300"/>
+                                        <p:tgtEl>
+                                          <p:spTgt spid="3">
+                                            <p:txEl>
+                                              <p:pRg st="1" end="1"/>
+                                            </p:txEl>
+                                          </p:spTgt>
+                                        </p:tgtEl>
+                                      </p:cBhvr>
+                                    </p:animEffect>
+                                  </p:childTnLst>
+                                </p:cTn>
+                              </p:par>
+                              <p:par>
+                                <p:cTn id="17" presetID="2" presetClass="entr" presetSubtype="8" fill="hold" grpId="0" nodeType="withEffect">
+                                  <p:stCondLst>
+                                    <p:cond delay="0"/>
+                                  </p:stCondLst>
+                                  <p:childTnLst>
+                                    <p:set>
+                                      <p:cBhvr>
+                                        <p:cTn id="18" dur="1" fill="hold">
+                                          <p:stCondLst>
+                                            <p:cond delay="0"/>
+                                          </p:stCondLst>
+                                        </p:cTn>
+                                        <p:tgtEl>
+                                          <p:spTgt spid="5"/>
+                                        </p:tgtEl>
+                                        <p:attrNameLst>
+                                          <p:attrName>style.visibility</p:attrName>
+                                        </p:attrNameLst>
+                                      </p:cBhvr>
+                                      <p:to>
+                                        <p:strVal val="visible"/>
+                                      </p:to>
+                                    </p:set>
+                                    <p:anim calcmode="lin" valueType="num">
+                                      <p:cBhvr additive="base">
+                                        <p:cTn id="19" dur="200" fill="hold"/>
+                                        <p:tgtEl>
+                                          <p:spTgt spid="5"/>
+                                        </p:tgtEl>
+                                        <p:attrNameLst>
+                                          <p:attrName>ppt_x</p:attrName>
+                                        </p:attrNameLst>
+                                      </p:cBhvr>
+                                      <p:tavLst>
+                                        <p:tav tm="0">
+                                          <p:val>
+                                            <p:strVal val="0-#ppt_w/2"/>
+                                          </p:val>
+                                        </p:tav>
+                                        <p:tav tm="100000">
+                                          <p:val>
+                                            <p:strVal val="#ppt_x"/>
+                                          </p:val>
+                                        </p:tav>
+                                      </p:tavLst>
+                                    </p:anim>
+                                    <p:anim calcmode="lin" valueType="num">
+                                      <p:cBhvr additive="base">
+                                        <p:cTn id="20" dur="200" fill="hold"/>
+                                        <p:tgtEl>
+                                          <p:spTgt spid="5"/>
+                                        </p:tgtEl>
+                                        <p:attrNameLst>
+                                          <p:attrName>ppt_y</p:attrName>
+                                        </p:attrNameLst>
+                                      </p:cBhvr>
+                                      <p:tavLst>
+                                        <p:tav tm="0">
+                                          <p:val>
+                                            <p:strVal val="#ppt_y"/>
+                                          </p:val>
+                                        </p:tav>
+                                        <p:tav tm="100000">
+                                          <p:val>
+                                            <p:strVal val="#ppt_y"/>
+                                          </p:val>
+                                        </p:tav>
+                                      </p:tavLst>
+                                    </p:anim>
+                                  </p:childTnLst>
+                                </p:cTn>
+                              </p:par>
+                            </p:childTnLst>
+                          </p:cTn>
+                        </p:par>
+                        <p:par>
+                          <p:cTn id="21" fill="hold">
+                            <p:stCondLst>
+                              <p:cond delay="600"/>
+                            </p:stCondLst>
+                            <p:childTnLst>
+                              <p:par>
+                                <p:cTn id="22" presetID="22" presetClass="entr" presetSubtype="8" fill="hold" grpId="0" nodeType="afterEffect">
+                                  <p:stCondLst>
+                                    <p:cond delay="0"/>
+                                  </p:stCondLst>
+                                  <p:childTnLst>
+                                    <p:set>
+                                      <p:cBhvr>
+                                        <p:cTn id="23" dur="1" fill="hold">
+                                          <p:stCondLst>
+                                            <p:cond delay="0"/>
+                                          </p:stCondLst>
+                                        </p:cTn>
+                                        <p:tgtEl>
+                                          <p:spTgt spid="3">
+                                            <p:txEl>
+                                              <p:pRg st="2" end="2"/>
+                                            </p:txEl>
+                                          </p:spTgt>
+                                        </p:tgtEl>
+                                        <p:attrNameLst>
+                                          <p:attrName>style.visibility</p:attrName>
+                                        </p:attrNameLst>
+                                      </p:cBhvr>
+                                      <p:to>
+                                        <p:strVal val="visible"/>
+                                      </p:to>
+                                    </p:set>
+                                    <p:animEffect transition="in" filter="wipe(left)">
+                                      <p:cBhvr>
+                                        <p:cTn id="24" dur="300"/>
+                                        <p:tgtEl>
+                                          <p:spTgt spid="3">
+                                            <p:txEl>
+                                              <p:pRg st="2" end="2"/>
+                                            </p:txEl>
+                                          </p:spTgt>
+                                        </p:tgtEl>
+                                      </p:cBhvr>
+                                    </p:animEffect>
+                                  </p:childTnLst>
+                                </p:cTn>
+                              </p:par>
+                              <p:par>
+                                <p:cTn id="25" presetID="2" presetClass="entr" presetSubtype="8" fill="hold" grpId="0" nodeType="withEffect">
+                                  <p:stCondLst>
+                                    <p:cond delay="0"/>
+                                  </p:stCondLst>
+                                  <p:childTnLst>
+                                    <p:set>
+                                      <p:cBhvr>
+                                        <p:cTn id="26" dur="1" fill="hold">
+                                          <p:stCondLst>
+                                            <p:cond delay="0"/>
+                                          </p:stCondLst>
+                                        </p:cTn>
+                                        <p:tgtEl>
+                                          <p:spTgt spid="6"/>
+                                        </p:tgtEl>
+                                        <p:attrNameLst>
+                                          <p:attrName>style.visibility</p:attrName>
+                                        </p:attrNameLst>
+                                      </p:cBhvr>
+                                      <p:to>
+                                        <p:strVal val="visible"/>
+                                      </p:to>
+                                    </p:set>
+                                    <p:anim calcmode="lin" valueType="num">
+                                      <p:cBhvr additive="base">
+                                        <p:cTn id="27" dur="200" fill="hold"/>
+                                        <p:tgtEl>
+                                          <p:spTgt spid="6"/>
+                                        </p:tgtEl>
+                                        <p:attrNameLst>
+                                          <p:attrName>ppt_x</p:attrName>
+                                        </p:attrNameLst>
+                                      </p:cBhvr>
+                                      <p:tavLst>
+                                        <p:tav tm="0">
+                                          <p:val>
+                                            <p:strVal val="0-#ppt_w/2"/>
+                                          </p:val>
+                                        </p:tav>
+                                        <p:tav tm="100000">
+                                          <p:val>
+                                            <p:strVal val="#ppt_x"/>
+                                          </p:val>
+                                        </p:tav>
+                                      </p:tavLst>
+                                    </p:anim>
+                                    <p:anim calcmode="lin" valueType="num">
+                                      <p:cBhvr additive="base">
+                                        <p:cTn id="28" dur="200" fill="hold"/>
+                                        <p:tgtEl>
+                                          <p:spTgt spid="6"/>
+                                        </p:tgtEl>
+                                        <p:attrNameLst>
+                                          <p:attrName>ppt_y</p:attrName>
+                                        </p:attrNameLst>
+                                      </p:cBhvr>
+                                      <p:tavLst>
+                                        <p:tav tm="0">
+                                          <p:val>
+                                            <p:strVal val="#ppt_y"/>
+                                          </p:val>
+                                        </p:tav>
+                                        <p:tav tm="100000">
+                                          <p:val>
+                                            <p:strVal val="#ppt_y"/>
+                                          </p:val>
+                                        </p:tav>
+                                      </p:tavLst>
+                                    </p:anim>
+                                  </p:childTnLst>
+                                </p:cTn>
+                              </p:par>
+                            </p:childTnLst>
+                          </p:cTn>
+                        </p:par>
+                        <p:par>
+                          <p:cTn id="29" fill="hold">
+                            <p:stCondLst>
+                              <p:cond delay="900"/>
+                            </p:stCondLst>
+                            <p:childTnLst>
+                              <p:par>
+                                <p:cTn id="30" presetID="22" presetClass="entr" presetSubtype="8" fill="hold" grpId="0" nodeType="afterEffect">
+                                  <p:stCondLst>
+                                    <p:cond delay="0"/>
+                                  </p:stCondLst>
+                                  <p:childTnLst>
+                                    <p:set>
+                                      <p:cBhvr>
+                                        <p:cTn id="31" dur="1" fill="hold">
+                                          <p:stCondLst>
+                                            <p:cond delay="0"/>
+                                          </p:stCondLst>
+                                        </p:cTn>
+                                        <p:tgtEl>
+                                          <p:spTgt spid="9">
+                                            <p:txEl>
+                                              <p:pRg st="1" end="1"/>
+                                            </p:txEl>
+                                          </p:spTgt>
+                                        </p:tgtEl>
+                                        <p:attrNameLst>
+                                          <p:attrName>style.visibility</p:attrName>
+                                        </p:attrNameLst>
+                                      </p:cBhvr>
+                                      <p:to>
+                                        <p:strVal val="visible"/>
+                                      </p:to>
+                                    </p:set>
+                                    <p:animEffect transition="in" filter="wipe(left)">
+                                      <p:cBhvr>
+                                        <p:cTn id="32" dur="300"/>
+                                        <p:tgtEl>
+                                          <p:spTgt spid="9">
+                                            <p:txEl>
+                                              <p:pRg st="1" end="1"/>
+                                            </p:txEl>
+                                          </p:spTgt>
+                                        </p:tgtEl>
+                                      </p:cBhvr>
+                                    </p:animEffect>
+                                  </p:childTnLst>
+                                </p:cTn>
+                              </p:par>
+                              <p:par>
+                                <p:cTn id="33" presetID="2" presetClass="entr" presetSubtype="8" fill="hold" grpId="0" nodeType="withEffect">
+                                  <p:stCondLst>
+                                    <p:cond delay="0"/>
+                                  </p:stCondLst>
+                                  <p:childTnLst>
+                                    <p:set>
+                                      <p:cBhvr>
+                                        <p:cTn id="34" dur="1" fill="hold">
+                                          <p:stCondLst>
+                                            <p:cond delay="0"/>
+                                          </p:stCondLst>
+                                        </p:cTn>
+                                        <p:tgtEl>
+                                          <p:spTgt spid="7"/>
+                                        </p:tgtEl>
+                                        <p:attrNameLst>
+                                          <p:attrName>style.visibility</p:attrName>
+                                        </p:attrNameLst>
+                                      </p:cBhvr>
+                                      <p:to>
+                                        <p:strVal val="visible"/>
+                                      </p:to>
+                                    </p:set>
+                                    <p:anim calcmode="lin" valueType="num">
+                                      <p:cBhvr additive="base">
+                                        <p:cTn id="35" dur="200" fill="hold"/>
+                                        <p:tgtEl>
+                                          <p:spTgt spid="7"/>
+                                        </p:tgtEl>
+                                        <p:attrNameLst>
+                                          <p:attrName>ppt_x</p:attrName>
+                                        </p:attrNameLst>
+                                      </p:cBhvr>
+                                      <p:tavLst>
+                                        <p:tav tm="0">
+                                          <p:val>
+                                            <p:strVal val="0-#ppt_w/2"/>
+                                          </p:val>
+                                        </p:tav>
+                                        <p:tav tm="100000">
+                                          <p:val>
+                                            <p:strVal val="#ppt_x"/>
+                                          </p:val>
+                                        </p:tav>
+                                      </p:tavLst>
+                                    </p:anim>
+                                    <p:anim calcmode="lin" valueType="num">
+                                      <p:cBhvr additive="base">
+                                        <p:cTn id="36" dur="200" fill="hold"/>
+                                        <p:tgtEl>
+                                          <p:spTgt spid="7"/>
+                                        </p:tgtEl>
+                                        <p:attrNameLst>
+                                          <p:attrName>ppt_y</p:attrName>
+                                        </p:attrNameLst>
+                                      </p:cBhvr>
+                                      <p:tavLst>
+                                        <p:tav tm="0">
+                                          <p:val>
+                                            <p:strVal val="#ppt_y"/>
+                                          </p:val>
+                                        </p:tav>
+                                        <p:tav tm="100000">
+                                          <p:val>
+                                            <p:strVal val="#ppt_y"/>
+                                          </p:val>
+                                        </p:tav>
+                                      </p:tavLst>
+                                    </p:anim>
+                                  </p:childTnLst>
+                                </p:cTn>
+                              </p:par>
+                            </p:childTnLst>
+                          </p:cTn>
+                        </p:par>
+                        <p:par>
+                          <p:cTn id="37" fill="hold">
+                            <p:stCondLst>
+                              <p:cond delay="1200"/>
+                            </p:stCondLst>
+                            <p:childTnLst>
+                              <p:par>
+                                <p:cTn id="38" presetID="22" presetClass="entr" presetSubtype="8" fill="hold" grpId="0" nodeType="afterEffect">
+                                  <p:stCondLst>
+                                    <p:cond delay="0"/>
+                                  </p:stCondLst>
+                                  <p:childTnLst>
+                                    <p:set>
+                                      <p:cBhvr>
+                                        <p:cTn id="39" dur="1" fill="hold">
+                                          <p:stCondLst>
+                                            <p:cond delay="0"/>
+                                          </p:stCondLst>
+                                        </p:cTn>
+                                        <p:tgtEl>
+                                          <p:spTgt spid="9">
+                                            <p:txEl>
+                                              <p:pRg st="2" end="2"/>
+                                            </p:txEl>
+                                          </p:spTgt>
+                                        </p:tgtEl>
+                                        <p:attrNameLst>
+                                          <p:attrName>style.visibility</p:attrName>
+                                        </p:attrNameLst>
+                                      </p:cBhvr>
+                                      <p:to>
+                                        <p:strVal val="visible"/>
+                                      </p:to>
+                                    </p:set>
+                                    <p:animEffect transition="in" filter="wipe(left)">
+                                      <p:cBhvr>
+                                        <p:cTn id="40" dur="300"/>
+                                        <p:tgtEl>
+                                          <p:spTgt spid="9">
+                                            <p:txEl>
+                                              <p:pRg st="2" end="2"/>
+                                            </p:txEl>
+                                          </p:spTgt>
+                                        </p:tgtEl>
+                                      </p:cBhvr>
+                                    </p:animEffect>
+                                  </p:childTnLst>
+                                </p:cTn>
+                              </p:par>
+                              <p:par>
+                                <p:cTn id="41" presetID="2" presetClass="entr" presetSubtype="8" fill="hold" grpId="0" nodeType="withEffect">
+                                  <p:stCondLst>
+                                    <p:cond delay="0"/>
+                                  </p:stCondLst>
+                                  <p:childTnLst>
+                                    <p:set>
+                                      <p:cBhvr>
+                                        <p:cTn id="42" dur="1" fill="hold">
+                                          <p:stCondLst>
+                                            <p:cond delay="0"/>
+                                          </p:stCondLst>
+                                        </p:cTn>
+                                        <p:tgtEl>
+                                          <p:spTgt spid="8"/>
+                                        </p:tgtEl>
+                                        <p:attrNameLst>
+                                          <p:attrName>style.visibility</p:attrName>
+                                        </p:attrNameLst>
+                                      </p:cBhvr>
+                                      <p:to>
+                                        <p:strVal val="visible"/>
+                                      </p:to>
+                                    </p:set>
+                                    <p:anim calcmode="lin" valueType="num">
+                                      <p:cBhvr additive="base">
+                                        <p:cTn id="43" dur="200" fill="hold"/>
+                                        <p:tgtEl>
+                                          <p:spTgt spid="8"/>
+                                        </p:tgtEl>
+                                        <p:attrNameLst>
+                                          <p:attrName>ppt_x</p:attrName>
+                                        </p:attrNameLst>
+                                      </p:cBhvr>
+                                      <p:tavLst>
+                                        <p:tav tm="0">
+                                          <p:val>
+                                            <p:strVal val="0-#ppt_w/2"/>
+                                          </p:val>
+                                        </p:tav>
+                                        <p:tav tm="100000">
+                                          <p:val>
+                                            <p:strVal val="#ppt_x"/>
+                                          </p:val>
+                                        </p:tav>
+                                      </p:tavLst>
+                                    </p:anim>
+                                    <p:anim calcmode="lin" valueType="num">
+                                      <p:cBhvr additive="base">
+                                        <p:cTn id="44" dur="200" fill="hold"/>
+                                        <p:tgtEl>
+                                          <p:spTgt spid="8"/>
+                                        </p:tgtEl>
+                                        <p:attrNameLst>
+                                          <p:attrName>ppt_y</p:attrName>
+                                        </p:attrNameLst>
+                                      </p:cBhvr>
+                                      <p:tavLst>
+                                        <p:tav tm="0">
+                                          <p:val>
+                                            <p:strVal val="#ppt_y"/>
+                                          </p:val>
+                                        </p:tav>
+                                        <p:tav tm="100000">
+                                          <p:val>
+                                            <p:strVal val="#ppt_y"/>
+                                          </p:val>
+                                        </p:tav>
+                                      </p:tavLst>
+                                    </p:anim>
+                                  </p:childTnLst>
+                                </p:cTn>
+                              </p:par>
+                            </p:childTnLst>
+                          </p:cTn>
+                        </p:par>
+                      </p:childTnLst>
+                    </p:cTn>
+                  </p:par>
+                </p:childTnLst>
+              </p:cTn>
+              <p:prevCondLst>
+                <p:cond evt="onPrev" delay="0">
+                  <p:tgtEl>
+                    <p:sldTgt/>
+                  </p:tgtEl>
+                </p:cond>
+              </p:prevCondLst>
+              <p:nextCondLst>
+                <p:cond evt="onNext" delay="0">
+                  <p:tgtEl>
+                    <p:sldTgt/>
+                  </p:tgtEl>
+                </p:cond>
+              </p:nextCondLst>
+            </p:seq>
+          </p:childTnLst>
+        </p:cTn>
+      </p:par>
+    </p:tnLst>
+    <p:bldLst>
+      <p:bldP spid="9" grpId="0" uiExpand="1" build="p"/>
+      <p:bldP spid="2" grpId="0"/>
+      <p:bldP spid="3" grpId="0" uiExpand="1" build="p"/>
+      <p:bldP spid="5" grpId="0" animBg="1"/>
+      <p:bldP spid="6" grpId="0" animBg="1"/>
+      <p:bldP spid="7" grpId="0" animBg="1"/>
+      <p:bldP spid="8" grpId="0" animBg="1"/>
+    </p:bldLst>
+  </p:timing>
+</p:sld>
+</file>
+
+<file path=ppt/slides/slide7.xml><?xml version="1.0" encoding="utf-8"?>
+<p:sld xmlns:a="http://schemas.openxmlformats.org/drawingml/2006/main" xmlns:r="http://schemas.openxmlformats.org/officeDocument/2006/relationships" xmlns:p="http://schemas.openxmlformats.org/presentationml/2006/main">
+  <p:cSld>
+    <p:spTree>
+      <p:nvGrpSpPr>
+        <p:cNvPr id="1" name=""/>
+        <p:cNvGrpSpPr/>
+        <p:nvPr/>
+      </p:nvGrpSpPr>
+      <p:grpSpPr>
+        <a:xfrm>
+          <a:off x="0" y="0"/>
+          <a:ext cx="0" cy="0"/>
+          <a:chOff x="0" y="0"/>
+          <a:chExt cx="0" cy="0"/>
+        </a:xfrm>
+      </p:grpSpPr>
+      <p:sp>
+        <p:nvSpPr>
+          <p:cNvPr id="4" name="Rectangle 3">
+            <a:extLst>
+              <a:ext uri="{FF2B5EF4-FFF2-40B4-BE49-F238E27FC236}">
+                <a16:creationId xmlns:a16="http://schemas.microsoft.com/office/drawing/2014/main" id="{8776CD77-6EC8-BB4E-AE45-FD9C04AADAF6}"/>
+              </a:ext>
+            </a:extLst>
+          </p:cNvPr>
+          <p:cNvSpPr/>
+          <p:nvPr/>
+        </p:nvSpPr>
+        <p:spPr>
+          <a:xfrm>
+            <a:off x="1" y="0"/>
+            <a:ext cx="12192000" cy="6858000"/>
+          </a:xfrm>
+          <a:prstGeom prst="rect">
+            <a:avLst/>
+          </a:prstGeom>
+          <a:blipFill dpi="0" rotWithShape="1">
+            <a:blip r:embed="rId3">
+              <a:alphaModFix amt="37000"/>
+            </a:blip>
+            <a:srcRect/>
+            <a:stretch>
+              <a:fillRect t="-6000" b="-17000"/>
+            </a:stretch>
+          </a:blipFill>
+          <a:ln>
+            <a:noFill/>
+          </a:ln>
+        </p:spPr>
+        <p:style>
+          <a:lnRef idx="2">
+            <a:schemeClr val="accent1">
+              <a:shade val="50000"/>
+            </a:schemeClr>
+          </a:lnRef>
+          <a:fillRef idx="1">
+            <a:schemeClr val="accent1"/>
+          </a:fillRef>
+          <a:effectRef idx="0">
+            <a:schemeClr val="accent1"/>
+          </a:effectRef>
+          <a:fontRef idx="minor">
+            <a:schemeClr val="lt1"/>
+          </a:fontRef>
+        </p:style>
+        <p:txBody>
+          <a:bodyPr rtlCol="0" anchor="ctr"/>
+          <a:lstStyle/>
+          <a:p>
+            <a:pPr algn="ctr"/>
+            <a:endParaRPr lang="en-US"/>
+          </a:p>
+        </p:txBody>
+      </p:sp>
+      <p:sp>
+        <p:nvSpPr>
+          <p:cNvPr id="2" name="Title 1">
+            <a:extLst>
+              <a:ext uri="{FF2B5EF4-FFF2-40B4-BE49-F238E27FC236}">
+                <a16:creationId xmlns:a16="http://schemas.microsoft.com/office/drawing/2014/main" id="{E871C266-3213-DC46-9244-B1D0B4A0AF23}"/>
+              </a:ext>
+            </a:extLst>
+          </p:cNvPr>
+          <p:cNvSpPr>
+            <a:spLocks noGrp="1"/>
+          </p:cNvSpPr>
+          <p:nvPr>
+            <p:ph type="title"/>
+          </p:nvPr>
+        </p:nvSpPr>
+        <p:spPr>
+          <a:xfrm>
+            <a:off x="1159342" y="793377"/>
+            <a:ext cx="2838916" cy="1478570"/>
+          </a:xfrm>
+        </p:spPr>
+        <p:txBody>
+          <a:bodyPr>
+            <a:normAutofit/>
+          </a:bodyPr>
+          <a:lstStyle/>
+          <a:p>
+            <a:pPr algn="ctr"/>
+            <a:r>
+              <a:rPr lang="en-US" sz="6600" dirty="0"/>
+              <a:t>Demo?</a:t>
+            </a:r>
+          </a:p>
+        </p:txBody>
+      </p:sp>
+    </p:spTree>
+    <p:extLst>
+      <p:ext uri="{BB962C8B-B14F-4D97-AF65-F5344CB8AC3E}">
+        <p14:creationId xmlns:p14="http://schemas.microsoft.com/office/powerpoint/2010/main" val="2934552898"/>
+      </p:ext>
+    </p:extLst>
+  </p:cSld>
+  <p:clrMapOvr>
+    <a:masterClrMapping/>
+  </p:clrMapOvr>
+  <p:timing>
+    <p:tnLst>
+      <p:par>
+        <p:cTn id="1" dur="indefinite" restart="never" nodeType="tmRoot">
+          <p:childTnLst>
+            <p:seq concurrent="1" nextAc="seek">
+              <p:cTn id="2" dur="indefinite" nodeType="mainSeq">
+                <p:childTnLst>
+                  <p:par>
+                    <p:cTn id="3" fill="hold">
+                      <p:stCondLst>
+                        <p:cond delay="indefinite"/>
+                      </p:stCondLst>
+                      <p:childTnLst>
+                        <p:par>
+                          <p:cTn id="4" fill="hold">
+                            <p:stCondLst>
+                              <p:cond delay="0"/>
+                            </p:stCondLst>
+                            <p:childTnLst>
+                              <p:par>
+                                <p:cTn id="5" presetID="9" presetClass="entr" presetSubtype="0" fill="hold" grpId="0" nodeType="clickEffect">
+                                  <p:stCondLst>
+                                    <p:cond delay="0"/>
+                                  </p:stCondLst>
+                                  <p:childTnLst>
+                                    <p:set>
+                                      <p:cBhvr>
+                                        <p:cTn id="6" dur="1" fill="hold">
+                                          <p:stCondLst>
+                                            <p:cond delay="0"/>
+                                          </p:stCondLst>
+                                        </p:cTn>
+                                        <p:tgtEl>
+                                          <p:spTgt spid="2"/>
+                                        </p:tgtEl>
+                                        <p:attrNameLst>
+                                          <p:attrName>style.visibility</p:attrName>
+                                        </p:attrNameLst>
+                                      </p:cBhvr>
+                                      <p:to>
+                                        <p:strVal val="visible"/>
+                                      </p:to>
+                                    </p:set>
+                                    <p:animEffect transition="in" filter="dissolve">
+                                      <p:cBhvr>
+                                        <p:cTn id="7" dur="300"/>
+                                        <p:tgtEl>
+                                          <p:spTgt spid="2"/>
+                                        </p:tgtEl>
+                                      </p:cBhvr>
+                                    </p:animEffect>
+                                  </p:childTnLst>
+                                </p:cTn>
+                              </p:par>
+                            </p:childTnLst>
+                          </p:cTn>
+                        </p:par>
+                        <p:par>
+                          <p:cTn id="8" fill="hold">
+                            <p:stCondLst>
+                              <p:cond delay="300"/>
+                            </p:stCondLst>
+                            <p:childTnLst>
+                              <p:par>
+                                <p:cTn id="9" presetID="10" presetClass="entr" presetSubtype="0" fill="hold" grpId="0" nodeType="afterEffect">
+                                  <p:stCondLst>
+                                    <p:cond delay="0"/>
+                                  </p:stCondLst>
+                                  <p:childTnLst>
+                                    <p:set>
+                                      <p:cBhvr>
+                                        <p:cTn id="10" dur="1" fill="hold">
+                                          <p:stCondLst>
+                                            <p:cond delay="0"/>
+                                          </p:stCondLst>
+                                        </p:cTn>
+                                        <p:tgtEl>
+                                          <p:spTgt spid="4"/>
+                                        </p:tgtEl>
+                                        <p:attrNameLst>
+                                          <p:attrName>style.visibility</p:attrName>
+                                        </p:attrNameLst>
+                                      </p:cBhvr>
+                                      <p:to>
+                                        <p:strVal val="visible"/>
+                                      </p:to>
+                                    </p:set>
+                                    <p:animEffect transition="in" filter="fade">
+                                      <p:cBhvr>
+                                        <p:cTn id="11" dur="2000"/>
+                                        <p:tgtEl>
+                                          <p:spTgt spid="4"/>
+                                        </p:tgtEl>
+                                      </p:cBhvr>
+                                    </p:animEffect>
+                                  </p:childTnLst>
+                                </p:cTn>
+                              </p:par>
+                            </p:childTnLst>
+                          </p:cTn>
+                        </p:par>
+                      </p:childTnLst>
+                    </p:cTn>
+                  </p:par>
+                </p:childTnLst>
+              </p:cTn>
+              <p:prevCondLst>
+                <p:cond evt="onPrev" delay="0">
+                  <p:tgtEl>
+                    <p:sldTgt/>
+                  </p:tgtEl>
+                </p:cond>
+              </p:prevCondLst>
+              <p:nextCondLst>
+                <p:cond evt="onNext" delay="0">
+                  <p:tgtEl>
+                    <p:sldTgt/>
+                  </p:tgtEl>
+                </p:cond>
+              </p:nextCondLst>
+            </p:seq>
+          </p:childTnLst>
+        </p:cTn>
+      </p:par>
+    </p:tnLst>
+    <p:bldLst>
+      <p:bldP spid="4" grpId="0" animBg="1"/>
+      <p:bldP spid="2" grpId="0"/>
+    </p:bldLst>
+  </p:timing>
+</p:sld>
+</file>
+
 <file path=ppt/theme/theme1.xml><?xml version="1.0" encoding="utf-8"?>
 <a:theme xmlns:a="http://schemas.openxmlformats.org/drawingml/2006/main" name="Circuit">
   <a:themeElements>

</xml_diff>

<commit_message>
Refactored Round model, converting ROUNDS class constant to @rounds class instance variable, and all related actions on ROUNDS constant
</commit_message>
<xml_diff>
--- a/ppt/Terminal App Presentation.pptx
+++ b/ppt/Terminal App Presentation.pptx
@@ -1072,7 +1072,7 @@
             </a:pPr>
             <a:r>
               <a:rPr lang="en-US" dirty="0"/>
-              <a:t>I initially tried to build my app under the Test Driven Development methodology, but due to limited experience building apps in Ruby I found this slowed my progress substantially as I wasn’t entirely sure how I was going to build the app before I got started</a:t>
+              <a:t>I initially tried to build my app according to Test Driven Development principles, but this slowed my progress significantly as I wasn’t familiar with this practice</a:t>
             </a:r>
           </a:p>
           <a:p>
@@ -1082,7 +1082,7 @@
             </a:pPr>
             <a:r>
               <a:rPr lang="en-US" dirty="0"/>
-              <a:t>Once I abandoned this approach and just started building, I appeared to be saving a lot of time, but whenever I wanted to test a feature I had built I had to do it manually which ultimately would have taken longer than writing tests first (assuming I knew how to do this beforehand)</a:t>
+              <a:t>I quickly abandoned this approach and just started building, which initially appeared to be saving a lot of time, but whenever I wanted to test a feature, I had to do it manually which ultimately would have taken longer than writing tests first</a:t>
             </a:r>
           </a:p>
           <a:p>
@@ -1102,7 +1102,7 @@
             </a:pPr>
             <a:r>
               <a:rPr lang="en-US" dirty="0"/>
-              <a:t>I also tried building the app in an MVC structure from my first line of code, but I began running into some serious trouble getting the code to work and was wasting too much time with file structure and not building anything</a:t>
+              <a:t>I also tried building the app in an MVC structure from my first line of code, but I began running into some serious trouble getting it to work and was wasting too much time with file structure and not building anything</a:t>
             </a:r>
           </a:p>
           <a:p>
@@ -1160,16 +1160,23 @@
             </a:pPr>
             <a:r>
               <a:rPr lang="en-US" dirty="0"/>
-              <a:t>I eventually realized I could just save the results of my View files to a local variable and then I was able to easily manipulate the data back in the controller (this will </a:t>
+              <a:t>I eventually realized I could just save the results of my View files to a local variable and then I was able to easily manipulate the data back in the controller</a:t>
+            </a:r>
+          </a:p>
+          <a:p>
+            <a:pPr marL="628650" lvl="1" indent="-171450">
+              <a:buFontTx/>
+              <a:buChar char="-"/>
+            </a:pPr>
+            <a:r>
+              <a:rPr lang="en-US" dirty="0"/>
+              <a:t>Once I started refactoring my codebase I realized I didn’t even need to do this ^ and came up </a:t>
             </a:r>
             <a:r>
               <a:rPr lang="en-US"/>
-              <a:t>become clearer </a:t>
+              <a:t>with an even better solution</a:t>
             </a:r>
-            <a:r>
-              <a:rPr lang="en-US" dirty="0"/>
-              <a:t>when I show an example in my code)</a:t>
-            </a:r>
+            <a:endParaRPr lang="en-US" dirty="0"/>
           </a:p>
           <a:p>
             <a:pPr marL="171450" lvl="0" indent="-171450">
@@ -1196,17 +1203,7 @@
             </a:r>
             <a:r>
               <a:rPr lang="en-US" dirty="0"/>
-              <a:t> of small features to enhance the user experience</a:t>
-            </a:r>
-          </a:p>
-          <a:p>
-            <a:pPr marL="628650" lvl="1" indent="-171450">
-              <a:buFontTx/>
-              <a:buChar char="-"/>
-            </a:pPr>
-            <a:r>
-              <a:rPr lang="en-US" dirty="0"/>
-              <a:t>Without strict code requirements or a deadline, this problem would eventually get completely out of control. Luckily this assignment is due Sunday night</a:t>
+              <a:t> of small features to enhance the user experience. Note to self, don’t do this again in future.</a:t>
             </a:r>
           </a:p>
         </p:txBody>
@@ -17109,8 +17106,8 @@
         </p:nvSpPr>
         <p:spPr>
           <a:xfrm>
-            <a:off x="6075908" y="2012423"/>
-            <a:ext cx="5125392" cy="4252912"/>
+            <a:off x="5942095" y="1142633"/>
+            <a:ext cx="5744385" cy="5122701"/>
           </a:xfrm>
           <a:prstGeom prst="rect">
             <a:avLst/>
@@ -17378,6 +17375,16 @@
               <a:t>	Exit Check</a:t>
             </a:r>
           </a:p>
+          <a:p>
+            <a:pPr marL="0" indent="0">
+              <a:buFont typeface="Arial" panose="020B0604020202020204" pitchFamily="34" charset="0"/>
+              <a:buNone/>
+            </a:pPr>
+            <a:r>
+              <a:rPr lang="en-US" sz="4000" dirty="0"/>
+              <a:t>	Sleep + DEMO mode</a:t>
+            </a:r>
+          </a:p>
         </p:txBody>
       </p:sp>
       <p:sp>
@@ -17394,7 +17401,7 @@
         </p:nvSpPr>
         <p:spPr>
           <a:xfrm>
-            <a:off x="6605527" y="2349358"/>
+            <a:off x="6471715" y="1524173"/>
             <a:ext cx="304800" cy="238539"/>
           </a:xfrm>
           <a:prstGeom prst="chevron">
@@ -17444,7 +17451,7 @@
         </p:nvSpPr>
         <p:spPr>
           <a:xfrm>
-            <a:off x="6606704" y="3163847"/>
+            <a:off x="6472892" y="2338662"/>
             <a:ext cx="304800" cy="238539"/>
           </a:xfrm>
           <a:prstGeom prst="chevron">
@@ -17494,7 +17501,7 @@
         </p:nvSpPr>
         <p:spPr>
           <a:xfrm>
-            <a:off x="6605527" y="4030742"/>
+            <a:off x="6471715" y="3205557"/>
             <a:ext cx="304800" cy="238539"/>
           </a:xfrm>
           <a:prstGeom prst="chevron">
@@ -17544,7 +17551,7 @@
         </p:nvSpPr>
         <p:spPr>
           <a:xfrm>
-            <a:off x="6605527" y="4887814"/>
+            <a:off x="6471715" y="4062629"/>
             <a:ext cx="304800" cy="238539"/>
           </a:xfrm>
           <a:prstGeom prst="chevron">
@@ -17594,7 +17601,57 @@
         </p:nvSpPr>
         <p:spPr>
           <a:xfrm>
-            <a:off x="6605527" y="5747512"/>
+            <a:off x="6471715" y="4922327"/>
+            <a:ext cx="304800" cy="238539"/>
+          </a:xfrm>
+          <a:prstGeom prst="chevron">
+            <a:avLst/>
+          </a:prstGeom>
+        </p:spPr>
+        <p:style>
+          <a:lnRef idx="2">
+            <a:schemeClr val="accent1">
+              <a:shade val="50000"/>
+            </a:schemeClr>
+          </a:lnRef>
+          <a:fillRef idx="1">
+            <a:schemeClr val="accent1"/>
+          </a:fillRef>
+          <a:effectRef idx="0">
+            <a:schemeClr val="accent1"/>
+          </a:effectRef>
+          <a:fontRef idx="minor">
+            <a:schemeClr val="lt1"/>
+          </a:fontRef>
+        </p:style>
+        <p:txBody>
+          <a:bodyPr rtlCol="0" anchor="ctr"/>
+          <a:lstStyle/>
+          <a:p>
+            <a:pPr algn="ctr"/>
+            <a:endParaRPr lang="en-US">
+              <a:solidFill>
+                <a:schemeClr val="tx1"/>
+              </a:solidFill>
+            </a:endParaRPr>
+          </a:p>
+        </p:txBody>
+      </p:sp>
+      <p:sp>
+        <p:nvSpPr>
+          <p:cNvPr id="16" name="Chevron 15">
+            <a:extLst>
+              <a:ext uri="{FF2B5EF4-FFF2-40B4-BE49-F238E27FC236}">
+                <a16:creationId xmlns:a16="http://schemas.microsoft.com/office/drawing/2014/main" id="{789E4680-AC56-1545-9B71-A97F7D7F3816}"/>
+              </a:ext>
+            </a:extLst>
+          </p:cNvPr>
+          <p:cNvSpPr/>
+          <p:nvPr/>
+        </p:nvSpPr>
+        <p:spPr>
+          <a:xfrm>
+            <a:off x="6471715" y="5747511"/>
             <a:ext cx="304800" cy="238539"/>
           </a:xfrm>
           <a:prstGeom prst="chevron">
@@ -18957,6 +19014,131 @@
                             </p:childTnLst>
                           </p:cTn>
                         </p:par>
+                        <p:par>
+                          <p:cTn id="89" fill="hold">
+                            <p:stCondLst>
+                              <p:cond delay="3000"/>
+                            </p:stCondLst>
+                            <p:childTnLst>
+                              <p:par>
+                                <p:cTn id="90" presetID="22" presetClass="entr" presetSubtype="8" fill="hold" grpId="0" nodeType="afterEffect">
+                                  <p:stCondLst>
+                                    <p:cond delay="0"/>
+                                  </p:stCondLst>
+                                  <p:childTnLst>
+                                    <p:set>
+                                      <p:cBhvr>
+                                        <p:cTn id="91" dur="1" fill="hold">
+                                          <p:stCondLst>
+                                            <p:cond delay="0"/>
+                                          </p:stCondLst>
+                                        </p:cTn>
+                                        <p:tgtEl>
+                                          <p:spTgt spid="10">
+                                            <p:txEl>
+                                              <p:pRg st="5" end="5"/>
+                                            </p:txEl>
+                                          </p:spTgt>
+                                        </p:tgtEl>
+                                        <p:attrNameLst>
+                                          <p:attrName>style.visibility</p:attrName>
+                                        </p:attrNameLst>
+                                      </p:cBhvr>
+                                      <p:to>
+                                        <p:strVal val="visible"/>
+                                      </p:to>
+                                    </p:set>
+                                    <p:animEffect transition="in" filter="wipe(left)">
+                                      <p:cBhvr>
+                                        <p:cTn id="92" dur="300"/>
+                                        <p:tgtEl>
+                                          <p:spTgt spid="10">
+                                            <p:txEl>
+                                              <p:pRg st="5" end="5"/>
+                                            </p:txEl>
+                                          </p:spTgt>
+                                        </p:tgtEl>
+                                      </p:cBhvr>
+                                    </p:animEffect>
+                                  </p:childTnLst>
+                                </p:cTn>
+                              </p:par>
+                              <p:par>
+                                <p:cTn id="93" presetID="2" presetClass="entr" presetSubtype="8" fill="hold" grpId="0" nodeType="withEffect">
+                                  <p:stCondLst>
+                                    <p:cond delay="0"/>
+                                  </p:stCondLst>
+                                  <p:childTnLst>
+                                    <p:set>
+                                      <p:cBhvr>
+                                        <p:cTn id="94" dur="1" fill="hold">
+                                          <p:stCondLst>
+                                            <p:cond delay="0"/>
+                                          </p:stCondLst>
+                                        </p:cTn>
+                                        <p:tgtEl>
+                                          <p:spTgt spid="16"/>
+                                        </p:tgtEl>
+                                        <p:attrNameLst>
+                                          <p:attrName>style.visibility</p:attrName>
+                                        </p:attrNameLst>
+                                      </p:cBhvr>
+                                      <p:to>
+                                        <p:strVal val="visible"/>
+                                      </p:to>
+                                    </p:set>
+                                    <p:anim calcmode="lin" valueType="num">
+                                      <p:cBhvr additive="base">
+                                        <p:cTn id="95" dur="200" fill="hold"/>
+                                        <p:tgtEl>
+                                          <p:spTgt spid="16"/>
+                                        </p:tgtEl>
+                                        <p:attrNameLst>
+                                          <p:attrName>ppt_x</p:attrName>
+                                        </p:attrNameLst>
+                                      </p:cBhvr>
+                                      <p:tavLst>
+                                        <p:tav tm="0">
+                                          <p:val>
+                                            <p:strVal val="0-#ppt_w/2"/>
+                                          </p:val>
+                                        </p:tav>
+                                        <p:tav tm="100000">
+                                          <p:val>
+                                            <p:strVal val="#ppt_x"/>
+                                          </p:val>
+                                        </p:tav>
+                                      </p:tavLst>
+                                    </p:anim>
+                                    <p:anim calcmode="lin" valueType="num">
+                                      <p:cBhvr additive="base">
+                                        <p:cTn id="96" dur="200" fill="hold"/>
+                                        <p:tgtEl>
+                                          <p:spTgt spid="16"/>
+                                        </p:tgtEl>
+                                        <p:attrNameLst>
+                                          <p:attrName>ppt_y</p:attrName>
+                                        </p:attrNameLst>
+                                      </p:cBhvr>
+                                      <p:tavLst>
+                                        <p:tav tm="0">
+                                          <p:val>
+                                            <p:strVal val="#ppt_y"/>
+                                          </p:val>
+                                        </p:tav>
+                                        <p:tav tm="100000">
+                                          <p:val>
+                                            <p:strVal val="#ppt_y"/>
+                                          </p:val>
+                                        </p:tav>
+                                      </p:tavLst>
+                                    </p:anim>
+                                  </p:childTnLst>
+                                </p:cTn>
+                              </p:par>
+                            </p:childTnLst>
+                          </p:cTn>
+                        </p:par>
                       </p:childTnLst>
                     </p:cTn>
                   </p:par>
@@ -18995,6 +19177,7 @@
       <p:bldP spid="13" grpId="0" animBg="1"/>
       <p:bldP spid="14" grpId="0" animBg="1"/>
       <p:bldP spid="15" grpId="0" animBg="1"/>
+      <p:bldP spid="16" grpId="0" animBg="1"/>
     </p:bldLst>
   </p:timing>
 </p:sld>

</xml_diff>

<commit_message>
Updated presentation, added comments to options view and rounds view
</commit_message>
<xml_diff>
--- a/ppt/Terminal App Presentation.pptx
+++ b/ppt/Terminal App Presentation.pptx
@@ -5,7 +5,7 @@
     <p:sldMasterId id="2147483687" r:id="rId1"/>
   </p:sldMasterIdLst>
   <p:notesMasterIdLst>
-    <p:notesMasterId r:id="rId9"/>
+    <p:notesMasterId r:id="rId11"/>
   </p:notesMasterIdLst>
   <p:sldIdLst>
     <p:sldId id="256" r:id="rId2"/>
@@ -15,6 +15,8 @@
     <p:sldId id="259" r:id="rId6"/>
     <p:sldId id="262" r:id="rId7"/>
     <p:sldId id="261" r:id="rId8"/>
+    <p:sldId id="263" r:id="rId9"/>
+    <p:sldId id="264" r:id="rId10"/>
   </p:sldIdLst>
   <p:sldSz cx="12192000" cy="6858000"/>
   <p:notesSz cx="6858000" cy="9144000"/>
@@ -1170,13 +1172,8 @@
             </a:pPr>
             <a:r>
               <a:rPr lang="en-US" dirty="0"/>
-              <a:t>Once I started refactoring my codebase I realized I didn’t even need to do this ^ and came up </a:t>
+              <a:t>Once I started refactoring my codebase I realized I didn’t even need to do this ^ and came up with an even better solution</a:t>
             </a:r>
-            <a:r>
-              <a:rPr lang="en-US"/>
-              <a:t>with an even better solution</a:t>
-            </a:r>
-            <a:endParaRPr lang="en-US" dirty="0"/>
           </a:p>
           <a:p>
             <a:pPr marL="171450" lvl="0" indent="-171450">
@@ -20679,6 +20676,131 @@
 </p:sld>
 </file>
 
+<file path=ppt/slides/slide8.xml><?xml version="1.0" encoding="utf-8"?>
+<p:sld xmlns:a="http://schemas.openxmlformats.org/drawingml/2006/main" xmlns:r="http://schemas.openxmlformats.org/officeDocument/2006/relationships" xmlns:p="http://schemas.openxmlformats.org/presentationml/2006/main">
+  <p:cSld>
+    <p:spTree>
+      <p:nvGrpSpPr>
+        <p:cNvPr id="1" name=""/>
+        <p:cNvGrpSpPr/>
+        <p:nvPr/>
+      </p:nvGrpSpPr>
+      <p:grpSpPr>
+        <a:xfrm>
+          <a:off x="0" y="0"/>
+          <a:ext cx="0" cy="0"/>
+          <a:chOff x="0" y="0"/>
+          <a:chExt cx="0" cy="0"/>
+        </a:xfrm>
+      </p:grpSpPr>
+      <p:sp>
+        <p:nvSpPr>
+          <p:cNvPr id="5" name="Title 1">
+            <a:extLst>
+              <a:ext uri="{FF2B5EF4-FFF2-40B4-BE49-F238E27FC236}">
+                <a16:creationId xmlns:a16="http://schemas.microsoft.com/office/drawing/2014/main" id="{AA179CD0-6C4B-D94B-80F5-7C48F5999F66}"/>
+              </a:ext>
+            </a:extLst>
+          </p:cNvPr>
+          <p:cNvSpPr>
+            <a:spLocks noGrp="1"/>
+          </p:cNvSpPr>
+          <p:nvPr>
+            <p:ph type="title"/>
+          </p:nvPr>
+        </p:nvSpPr>
+        <p:spPr>
+          <a:xfrm>
+            <a:off x="3884612" y="2625737"/>
+            <a:ext cx="4233475" cy="1478570"/>
+          </a:xfrm>
+        </p:spPr>
+        <p:txBody>
+          <a:bodyPr>
+            <a:normAutofit/>
+          </a:bodyPr>
+          <a:lstStyle/>
+          <a:p>
+            <a:pPr algn="ctr"/>
+            <a:r>
+              <a:rPr lang="en-US" sz="6600" dirty="0"/>
+              <a:t>Appendix</a:t>
+            </a:r>
+          </a:p>
+        </p:txBody>
+      </p:sp>
+    </p:spTree>
+    <p:extLst>
+      <p:ext uri="{BB962C8B-B14F-4D97-AF65-F5344CB8AC3E}">
+        <p14:creationId xmlns:p14="http://schemas.microsoft.com/office/powerpoint/2010/main" val="2485864768"/>
+      </p:ext>
+    </p:extLst>
+  </p:cSld>
+  <p:clrMapOvr>
+    <a:masterClrMapping/>
+  </p:clrMapOvr>
+</p:sld>
+</file>
+
+<file path=ppt/slides/slide9.xml><?xml version="1.0" encoding="utf-8"?>
+<p:sld xmlns:a="http://schemas.openxmlformats.org/drawingml/2006/main" xmlns:r="http://schemas.openxmlformats.org/officeDocument/2006/relationships" xmlns:p="http://schemas.openxmlformats.org/presentationml/2006/main">
+  <p:cSld>
+    <p:spTree>
+      <p:nvGrpSpPr>
+        <p:cNvPr id="1" name=""/>
+        <p:cNvGrpSpPr/>
+        <p:nvPr/>
+      </p:nvGrpSpPr>
+      <p:grpSpPr>
+        <a:xfrm>
+          <a:off x="0" y="0"/>
+          <a:ext cx="0" cy="0"/>
+          <a:chOff x="0" y="0"/>
+          <a:chExt cx="0" cy="0"/>
+        </a:xfrm>
+      </p:grpSpPr>
+      <p:pic>
+        <p:nvPicPr>
+          <p:cNvPr id="5" name="Picture 4">
+            <a:extLst>
+              <a:ext uri="{FF2B5EF4-FFF2-40B4-BE49-F238E27FC236}">
+                <a16:creationId xmlns:a16="http://schemas.microsoft.com/office/drawing/2014/main" id="{E6765F19-13FC-AB42-9AB0-988B26B2E6DF}"/>
+              </a:ext>
+            </a:extLst>
+          </p:cNvPr>
+          <p:cNvPicPr>
+            <a:picLocks noChangeAspect="1"/>
+          </p:cNvPicPr>
+          <p:nvPr/>
+        </p:nvPicPr>
+        <p:blipFill rotWithShape="1">
+          <a:blip r:embed="rId2"/>
+          <a:srcRect t="2927" b="2439"/>
+          <a:stretch/>
+        </p:blipFill>
+        <p:spPr>
+          <a:xfrm>
+            <a:off x="1367882" y="0"/>
+            <a:ext cx="9662474" cy="6858000"/>
+          </a:xfrm>
+          <a:prstGeom prst="rect">
+            <a:avLst/>
+          </a:prstGeom>
+        </p:spPr>
+      </p:pic>
+    </p:spTree>
+    <p:extLst>
+      <p:ext uri="{BB962C8B-B14F-4D97-AF65-F5344CB8AC3E}">
+        <p14:creationId xmlns:p14="http://schemas.microsoft.com/office/powerpoint/2010/main" val="915185741"/>
+      </p:ext>
+    </p:extLst>
+  </p:cSld>
+  <p:clrMapOvr>
+    <a:masterClrMapping/>
+  </p:clrMapOvr>
+</p:sld>
+</file>
+
 <file path=ppt/theme/theme1.xml><?xml version="1.0" encoding="utf-8"?>
 <a:theme xmlns:a="http://schemas.openxmlformats.org/drawingml/2006/main" name="Circuit">
   <a:themeElements>

</xml_diff>

<commit_message>
Updated powerpoint presentation, Switched quote generator to DEMO, Refactored rounds view by mapping results to sound paths in a hash in Rounds model
</commit_message>
<xml_diff>
--- a/ppt/Terminal App Presentation.pptx
+++ b/ppt/Terminal App Presentation.pptx
@@ -15,7 +15,7 @@
     <p:sldId id="259" r:id="rId6"/>
     <p:sldId id="262" r:id="rId7"/>
     <p:sldId id="261" r:id="rId8"/>
-    <p:sldId id="263" r:id="rId9"/>
+    <p:sldId id="265" r:id="rId9"/>
     <p:sldId id="264" r:id="rId10"/>
   </p:sldIdLst>
   <p:sldSz cx="12192000" cy="6858000"/>
@@ -205,7 +205,7 @@
           <a:p>
             <a:fld id="{905D35E0-9760-DE47-955B-C4A953B63D54}" type="datetimeFigureOut">
               <a:rPr lang="en-US" smtClean="0"/>
-              <a:t>9/29/20</a:t>
+              <a:t>10/1/20</a:t>
             </a:fld>
             <a:endParaRPr lang="en-US"/>
           </a:p>
@@ -5616,7 +5616,7 @@
           <a:p>
             <a:fld id="{48A87A34-81AB-432B-8DAE-1953F412C126}" type="datetimeFigureOut">
               <a:rPr lang="en-US" smtClean="0"/>
-              <a:t>9/29/20</a:t>
+              <a:t>10/1/20</a:t>
             </a:fld>
             <a:endParaRPr lang="en-US" dirty="0"/>
           </a:p>
@@ -5883,7 +5883,7 @@
           <a:p>
             <a:fld id="{48A87A34-81AB-432B-8DAE-1953F412C126}" type="datetimeFigureOut">
               <a:rPr lang="en-US" smtClean="0"/>
-              <a:t>9/29/20</a:t>
+              <a:t>10/1/20</a:t>
             </a:fld>
             <a:endParaRPr lang="en-US" dirty="0"/>
           </a:p>
@@ -6079,7 +6079,7 @@
           <a:p>
             <a:fld id="{48A87A34-81AB-432B-8DAE-1953F412C126}" type="datetimeFigureOut">
               <a:rPr lang="en-US" smtClean="0"/>
-              <a:t>9/29/20</a:t>
+              <a:t>10/1/20</a:t>
             </a:fld>
             <a:endParaRPr lang="en-US" dirty="0"/>
           </a:p>
@@ -6342,7 +6342,7 @@
           <a:p>
             <a:fld id="{48A87A34-81AB-432B-8DAE-1953F412C126}" type="datetimeFigureOut">
               <a:rPr lang="en-US" smtClean="0"/>
-              <a:t>9/29/20</a:t>
+              <a:t>10/1/20</a:t>
             </a:fld>
             <a:endParaRPr lang="en-US" dirty="0"/>
           </a:p>
@@ -6776,7 +6776,7 @@
           <a:p>
             <a:fld id="{48A87A34-81AB-432B-8DAE-1953F412C126}" type="datetimeFigureOut">
               <a:rPr lang="en-US" smtClean="0"/>
-              <a:t>9/29/20</a:t>
+              <a:t>10/1/20</a:t>
             </a:fld>
             <a:endParaRPr lang="en-US" dirty="0"/>
           </a:p>
@@ -7322,7 +7322,7 @@
           <a:p>
             <a:fld id="{48A87A34-81AB-432B-8DAE-1953F412C126}" type="datetimeFigureOut">
               <a:rPr lang="en-US" smtClean="0"/>
-              <a:t>9/29/20</a:t>
+              <a:t>10/1/20</a:t>
             </a:fld>
             <a:endParaRPr lang="en-US" dirty="0"/>
           </a:p>
@@ -8042,7 +8042,7 @@
           <a:p>
             <a:fld id="{48A87A34-81AB-432B-8DAE-1953F412C126}" type="datetimeFigureOut">
               <a:rPr lang="en-US" smtClean="0"/>
-              <a:t>9/29/20</a:t>
+              <a:t>10/1/20</a:t>
             </a:fld>
             <a:endParaRPr lang="en-US" dirty="0"/>
           </a:p>
@@ -8212,7 +8212,7 @@
           <a:p>
             <a:fld id="{48A87A34-81AB-432B-8DAE-1953F412C126}" type="datetimeFigureOut">
               <a:rPr lang="en-US" smtClean="0"/>
-              <a:t>9/29/20</a:t>
+              <a:t>10/1/20</a:t>
             </a:fld>
             <a:endParaRPr lang="en-US" dirty="0"/>
           </a:p>
@@ -8392,7 +8392,7 @@
           <a:p>
             <a:fld id="{48A87A34-81AB-432B-8DAE-1953F412C126}" type="datetimeFigureOut">
               <a:rPr lang="en-US" smtClean="0"/>
-              <a:t>9/29/20</a:t>
+              <a:t>10/1/20</a:t>
             </a:fld>
             <a:endParaRPr lang="en-US" dirty="0"/>
           </a:p>
@@ -8562,7 +8562,7 @@
           <a:p>
             <a:fld id="{48A87A34-81AB-432B-8DAE-1953F412C126}" type="datetimeFigureOut">
               <a:rPr lang="en-US" smtClean="0"/>
-              <a:t>9/29/20</a:t>
+              <a:t>10/1/20</a:t>
             </a:fld>
             <a:endParaRPr lang="en-US" dirty="0"/>
           </a:p>
@@ -8812,7 +8812,7 @@
           <a:p>
             <a:fld id="{48A87A34-81AB-432B-8DAE-1953F412C126}" type="datetimeFigureOut">
               <a:rPr lang="en-US" smtClean="0"/>
-              <a:t>9/29/20</a:t>
+              <a:t>10/1/20</a:t>
             </a:fld>
             <a:endParaRPr lang="en-US" dirty="0"/>
           </a:p>
@@ -9044,7 +9044,7 @@
           <a:p>
             <a:fld id="{48A87A34-81AB-432B-8DAE-1953F412C126}" type="datetimeFigureOut">
               <a:rPr lang="en-US" smtClean="0"/>
-              <a:t>9/29/20</a:t>
+              <a:t>10/1/20</a:t>
             </a:fld>
             <a:endParaRPr lang="en-US" dirty="0"/>
           </a:p>
@@ -9425,7 +9425,7 @@
           <a:p>
             <a:fld id="{48A87A34-81AB-432B-8DAE-1953F412C126}" type="datetimeFigureOut">
               <a:rPr lang="en-US" smtClean="0"/>
-              <a:t>9/29/20</a:t>
+              <a:t>10/1/20</a:t>
             </a:fld>
             <a:endParaRPr lang="en-US" dirty="0"/>
           </a:p>
@@ -9543,7 +9543,7 @@
           <a:p>
             <a:fld id="{48A87A34-81AB-432B-8DAE-1953F412C126}" type="datetimeFigureOut">
               <a:rPr lang="en-US" smtClean="0"/>
-              <a:t>9/29/20</a:t>
+              <a:t>10/1/20</a:t>
             </a:fld>
             <a:endParaRPr lang="en-US" dirty="0"/>
           </a:p>
@@ -9638,7 +9638,7 @@
           <a:p>
             <a:fld id="{48A87A34-81AB-432B-8DAE-1953F412C126}" type="datetimeFigureOut">
               <a:rPr lang="en-US" smtClean="0"/>
-              <a:t>9/29/20</a:t>
+              <a:t>10/1/20</a:t>
             </a:fld>
             <a:endParaRPr lang="en-US" dirty="0"/>
           </a:p>
@@ -9887,7 +9887,7 @@
           <a:p>
             <a:fld id="{48A87A34-81AB-432B-8DAE-1953F412C126}" type="datetimeFigureOut">
               <a:rPr lang="en-US" smtClean="0"/>
-              <a:t>9/29/20</a:t>
+              <a:t>10/1/20</a:t>
             </a:fld>
             <a:endParaRPr lang="en-US" dirty="0"/>
           </a:p>
@@ -10167,7 +10167,7 @@
           <a:p>
             <a:fld id="{48A87A34-81AB-432B-8DAE-1953F412C126}" type="datetimeFigureOut">
               <a:rPr lang="en-US" smtClean="0"/>
-              <a:t>9/29/20</a:t>
+              <a:t>10/1/20</a:t>
             </a:fld>
             <a:endParaRPr lang="en-US" dirty="0"/>
           </a:p>
@@ -13252,7 +13252,7 @@
             <a:fld id="{48A87A34-81AB-432B-8DAE-1953F412C126}" type="datetimeFigureOut">
               <a:rPr lang="en-US" smtClean="0"/>
               <a:pPr/>
-              <a:t>9/29/20</a:t>
+              <a:t>10/1/20</a:t>
             </a:fld>
             <a:endParaRPr lang="en-US" dirty="0"/>
           </a:p>
@@ -20695,44 +20695,99 @@
       </p:grpSpPr>
       <p:sp>
         <p:nvSpPr>
-          <p:cNvPr id="5" name="Title 1">
+          <p:cNvPr id="4" name="Title 1">
             <a:extLst>
               <a:ext uri="{FF2B5EF4-FFF2-40B4-BE49-F238E27FC236}">
-                <a16:creationId xmlns:a16="http://schemas.microsoft.com/office/drawing/2014/main" id="{AA179CD0-6C4B-D94B-80F5-7C48F5999F66}"/>
+                <a16:creationId xmlns:a16="http://schemas.microsoft.com/office/drawing/2014/main" id="{120D3408-2F9B-004C-8FBF-C4160AE2C6EF}"/>
               </a:ext>
             </a:extLst>
           </p:cNvPr>
-          <p:cNvSpPr>
-            <a:spLocks noGrp="1"/>
+          <p:cNvSpPr txBox="1">
+            <a:spLocks/>
           </p:cNvSpPr>
-          <p:nvPr>
-            <p:ph type="title"/>
-          </p:nvPr>
+          <p:nvPr/>
         </p:nvSpPr>
         <p:spPr>
           <a:xfrm>
-            <a:off x="3884612" y="2625737"/>
-            <a:ext cx="4233475" cy="1478570"/>
+            <a:off x="1469475" y="2637285"/>
+            <a:ext cx="2875206" cy="875453"/>
           </a:xfrm>
+          <a:prstGeom prst="rect">
+            <a:avLst/>
+          </a:prstGeom>
         </p:spPr>
         <p:txBody>
-          <a:bodyPr>
+          <a:bodyPr vert="horz" lIns="91440" tIns="45720" rIns="91440" bIns="45720" rtlCol="0" anchor="ctr">
             <a:normAutofit/>
           </a:bodyPr>
-          <a:lstStyle/>
+          <a:lstStyle>
+            <a:lvl1pPr algn="l" defTabSz="914400" rtl="0" eaLnBrk="1" latinLnBrk="0" hangingPunct="1">
+              <a:lnSpc>
+                <a:spcPct val="90000"/>
+              </a:lnSpc>
+              <a:spcBef>
+                <a:spcPct val="0"/>
+              </a:spcBef>
+              <a:buNone/>
+              <a:defRPr sz="3600" kern="1200" cap="all" baseline="0">
+                <a:solidFill>
+                  <a:schemeClr val="tx1"/>
+                </a:solidFill>
+                <a:effectLst>
+                  <a:outerShdw blurRad="177800" dist="38100" dir="2700000" algn="tl">
+                    <a:srgbClr val="000000">
+                      <a:alpha val="24000"/>
+                    </a:srgbClr>
+                  </a:outerShdw>
+                </a:effectLst>
+                <a:latin typeface="+mj-lt"/>
+                <a:ea typeface="+mj-ea"/>
+                <a:cs typeface="+mj-cs"/>
+              </a:defRPr>
+            </a:lvl1pPr>
+          </a:lstStyle>
           <a:p>
             <a:pPr algn="ctr"/>
             <a:r>
-              <a:rPr lang="en-US" sz="6600" dirty="0"/>
-              <a:t>Appendix</a:t>
+              <a:rPr lang="en-US" sz="4000" dirty="0"/>
+              <a:t>Flowchart</a:t>
             </a:r>
           </a:p>
         </p:txBody>
       </p:sp>
+      <p:pic>
+        <p:nvPicPr>
+          <p:cNvPr id="6" name="Picture 5">
+            <a:extLst>
+              <a:ext uri="{FF2B5EF4-FFF2-40B4-BE49-F238E27FC236}">
+                <a16:creationId xmlns:a16="http://schemas.microsoft.com/office/drawing/2014/main" id="{12F3C200-EBF1-1C47-BEC5-71E15C3F002D}"/>
+              </a:ext>
+            </a:extLst>
+          </p:cNvPr>
+          <p:cNvPicPr>
+            <a:picLocks noChangeAspect="1"/>
+          </p:cNvPicPr>
+          <p:nvPr/>
+        </p:nvPicPr>
+        <p:blipFill rotWithShape="1">
+          <a:blip r:embed="rId2"/>
+          <a:srcRect b="-2589"/>
+          <a:stretch/>
+        </p:blipFill>
+        <p:spPr>
+          <a:xfrm>
+            <a:off x="5375564" y="193960"/>
+            <a:ext cx="4069499" cy="6637557"/>
+          </a:xfrm>
+          <a:prstGeom prst="rect">
+            <a:avLst/>
+          </a:prstGeom>
+        </p:spPr>
+      </p:pic>
     </p:spTree>
     <p:extLst>
       <p:ext uri="{BB962C8B-B14F-4D97-AF65-F5344CB8AC3E}">
-        <p14:creationId xmlns:p14="http://schemas.microsoft.com/office/powerpoint/2010/main" val="2485864768"/>
+        <p14:creationId xmlns:p14="http://schemas.microsoft.com/office/powerpoint/2010/main" val="2474334442"/>
       </p:ext>
     </p:extLst>
   </p:cSld>
@@ -20788,6 +20843,42 @@
           </a:prstGeom>
         </p:spPr>
       </p:pic>
+      <p:sp>
+        <p:nvSpPr>
+          <p:cNvPr id="3" name="Title 1">
+            <a:extLst>
+              <a:ext uri="{FF2B5EF4-FFF2-40B4-BE49-F238E27FC236}">
+                <a16:creationId xmlns:a16="http://schemas.microsoft.com/office/drawing/2014/main" id="{FC3A99D0-3487-7046-91EC-E97D0BBAE5B7}"/>
+              </a:ext>
+            </a:extLst>
+          </p:cNvPr>
+          <p:cNvSpPr>
+            <a:spLocks noGrp="1"/>
+          </p:cNvSpPr>
+          <p:nvPr>
+            <p:ph type="title"/>
+          </p:nvPr>
+        </p:nvSpPr>
+        <p:spPr>
+          <a:xfrm>
+            <a:off x="7628021" y="4839547"/>
+            <a:ext cx="3137640" cy="1478570"/>
+          </a:xfrm>
+        </p:spPr>
+        <p:txBody>
+          <a:bodyPr>
+            <a:normAutofit/>
+          </a:bodyPr>
+          <a:lstStyle/>
+          <a:p>
+            <a:pPr algn="r"/>
+            <a:r>
+              <a:rPr lang="en-US" sz="4800" dirty="0"/>
+              <a:t>Code Overview</a:t>
+            </a:r>
+          </a:p>
+        </p:txBody>
+      </p:sp>
     </p:spTree>
     <p:extLst>
       <p:ext uri="{BB962C8B-B14F-4D97-AF65-F5344CB8AC3E}">

</xml_diff>